<commit_message>
:clock1: Add pace notes to demo script Also adjusting demo slide order to match demo script
</commit_message>
<xml_diff>
--- a/SlideDeck.pptx
+++ b/SlideDeck.pptx
@@ -5,10 +5,10 @@
     <p:sldMasterId id="2147484229" r:id="rId4"/>
   </p:sldMasterIdLst>
   <p:notesMasterIdLst>
-    <p:notesMasterId r:id="rId36"/>
+    <p:notesMasterId r:id="rId33"/>
   </p:notesMasterIdLst>
   <p:handoutMasterIdLst>
-    <p:handoutMasterId r:id="rId37"/>
+    <p:handoutMasterId r:id="rId34"/>
   </p:handoutMasterIdLst>
   <p:sldIdLst>
     <p:sldId id="1367" r:id="rId5"/>
@@ -34,14 +34,11 @@
     <p:sldId id="1464" r:id="rId25"/>
     <p:sldId id="1481" r:id="rId26"/>
     <p:sldId id="1480" r:id="rId27"/>
-    <p:sldId id="1479" r:id="rId28"/>
-    <p:sldId id="1493" r:id="rId29"/>
-    <p:sldId id="1494" r:id="rId30"/>
-    <p:sldId id="1467" r:id="rId31"/>
-    <p:sldId id="1498" r:id="rId32"/>
-    <p:sldId id="1468" r:id="rId33"/>
-    <p:sldId id="1492" r:id="rId34"/>
-    <p:sldId id="1484" r:id="rId35"/>
+    <p:sldId id="1467" r:id="rId28"/>
+    <p:sldId id="1498" r:id="rId29"/>
+    <p:sldId id="1468" r:id="rId30"/>
+    <p:sldId id="1492" r:id="rId31"/>
+    <p:sldId id="1484" r:id="rId32"/>
   </p:sldIdLst>
   <p:sldSz cx="12436475" cy="6994525"/>
   <p:notesSz cx="6858000" cy="9144000"/>
@@ -180,9 +177,6 @@
             <p14:sldId id="1464"/>
             <p14:sldId id="1481"/>
             <p14:sldId id="1480"/>
-            <p14:sldId id="1479"/>
-            <p14:sldId id="1493"/>
-            <p14:sldId id="1494"/>
             <p14:sldId id="1467"/>
             <p14:sldId id="1498"/>
             <p14:sldId id="1468"/>
@@ -327,7 +321,7 @@
               <a:rPr lang="en-US" smtClean="0">
                 <a:latin typeface="Segoe UI" pitchFamily="34" charset="0"/>
               </a:rPr>
-              <a:t>3/31/2016 11:42 AM</a:t>
+              <a:t>4/22/2016 2:12 PM</a:t>
             </a:fld>
             <a:endParaRPr lang="en-US" dirty="0">
               <a:latin typeface="Segoe UI" pitchFamily="34" charset="0"/>
@@ -608,7 +602,7 @@
           <a:p>
             <a:fld id="{38EEC551-8CDA-4EB6-89BB-2A86C9F091C8}" type="datetime8">
               <a:rPr lang="en-US" smtClean="0"/>
-              <a:t>3/31/2016 11:42 AM</a:t>
+              <a:t>4/22/2016 2:12 PM</a:t>
             </a:fld>
             <a:endParaRPr lang="en-US" dirty="0"/>
           </a:p>
@@ -11297,3082 +11291,6 @@
             </a:br>
             <a:r>
               <a:rPr lang="en-US" sz="4000" dirty="0"/>
-              <a:t>Model building pipeline</a:t>
-            </a:r>
-          </a:p>
-        </p:txBody>
-      </p:sp>
-      <p:pic>
-        <p:nvPicPr>
-          <p:cNvPr id="4" name="Picture 3" descr="ProcessMachine.png"/>
-          <p:cNvPicPr>
-            <a:picLocks noChangeAspect="1"/>
-          </p:cNvPicPr>
-          <p:nvPr/>
-        </p:nvPicPr>
-        <p:blipFill>
-          <a:blip r:embed="rId2">
-            <a:extLst>
-              <a:ext uri="{28A0092B-C50C-407E-A947-70E740481C1C}">
-                <a14:useLocalDpi xmlns:a14="http://schemas.microsoft.com/office/drawing/2010/main" val="0"/>
-              </a:ext>
-            </a:extLst>
-          </a:blip>
-          <a:stretch>
-            <a:fillRect/>
-          </a:stretch>
-        </p:blipFill>
-        <p:spPr>
-          <a:xfrm>
-            <a:off x="8047037" y="3421062"/>
-            <a:ext cx="4222704" cy="3262997"/>
-          </a:xfrm>
-          <a:prstGeom prst="rect">
-            <a:avLst/>
-          </a:prstGeom>
-        </p:spPr>
-      </p:pic>
-    </p:spTree>
-    <p:extLst>
-      <p:ext uri="{BB962C8B-B14F-4D97-AF65-F5344CB8AC3E}">
-        <p14:creationId xmlns:p14="http://schemas.microsoft.com/office/powerpoint/2010/main" val="3825712665"/>
-      </p:ext>
-    </p:extLst>
-  </p:cSld>
-  <p:clrMapOvr>
-    <a:masterClrMapping/>
-  </p:clrMapOvr>
-  <mc:AlternateContent xmlns:mc="http://schemas.openxmlformats.org/markup-compatibility/2006" xmlns:p14="http://schemas.microsoft.com/office/powerpoint/2010/main">
-    <mc:Choice Requires="p14">
-      <p:transition spd="slow" p14:dur="2000">
-        <p14:reveal/>
-      </p:transition>
-    </mc:Choice>
-    <mc:Fallback xmlns="">
-      <p:transition spd="slow">
-        <p:fade/>
-      </p:transition>
-    </mc:Fallback>
-  </mc:AlternateContent>
-</p:sld>
-</file>
-
-<file path=ppt/slides/slide25.xml><?xml version="1.0" encoding="utf-8"?>
-<p:sld xmlns:a="http://schemas.openxmlformats.org/drawingml/2006/main" xmlns:r="http://schemas.openxmlformats.org/officeDocument/2006/relationships" xmlns:p="http://schemas.openxmlformats.org/presentationml/2006/main">
-  <p:cSld>
-    <p:spTree>
-      <p:nvGrpSpPr>
-        <p:cNvPr id="1" name=""/>
-        <p:cNvGrpSpPr/>
-        <p:nvPr/>
-      </p:nvGrpSpPr>
-      <p:grpSpPr>
-        <a:xfrm>
-          <a:off x="0" y="0"/>
-          <a:ext cx="0" cy="0"/>
-          <a:chOff x="0" y="0"/>
-          <a:chExt cx="0" cy="0"/>
-        </a:xfrm>
-      </p:grpSpPr>
-      <p:sp>
-        <p:nvSpPr>
-          <p:cNvPr id="2" name="Title 1"/>
-          <p:cNvSpPr>
-            <a:spLocks noGrp="1"/>
-          </p:cNvSpPr>
-          <p:nvPr>
-            <p:ph type="title"/>
-          </p:nvPr>
-        </p:nvSpPr>
-        <p:spPr/>
-        <p:txBody>
-          <a:bodyPr/>
-          <a:lstStyle/>
-          <a:p>
-            <a:r>
-              <a:rPr lang="en-US"/>
-              <a:t>EF6.x model building pipeline</a:t>
-            </a:r>
-            <a:endParaRPr lang="en-US" dirty="0"/>
-          </a:p>
-        </p:txBody>
-      </p:sp>
-      <p:sp>
-        <p:nvSpPr>
-          <p:cNvPr id="23" name="Rectangle 22"/>
-          <p:cNvSpPr/>
-          <p:nvPr/>
-        </p:nvSpPr>
-        <p:spPr bwMode="auto">
-          <a:xfrm>
-            <a:off x="1492712" y="2125663"/>
-            <a:ext cx="2747963" cy="868434"/>
-          </a:xfrm>
-          <a:prstGeom prst="rect">
-            <a:avLst/>
-          </a:prstGeom>
-          <a:solidFill>
-            <a:schemeClr val="accent3"/>
-          </a:solidFill>
-          <a:ln>
-            <a:noFill/>
-            <a:headEnd type="none" w="med" len="med"/>
-            <a:tailEnd type="none" w="med" len="med"/>
-          </a:ln>
-        </p:spPr>
-        <p:style>
-          <a:lnRef idx="2">
-            <a:schemeClr val="accent1">
-              <a:shade val="50000"/>
-            </a:schemeClr>
-          </a:lnRef>
-          <a:fillRef idx="1">
-            <a:schemeClr val="accent1"/>
-          </a:fillRef>
-          <a:effectRef idx="0">
-            <a:schemeClr val="accent1"/>
-          </a:effectRef>
-          <a:fontRef idx="minor">
-            <a:schemeClr val="lt1"/>
-          </a:fontRef>
-        </p:style>
-        <p:txBody>
-          <a:bodyPr vert="horz" wrap="square" lIns="182828" tIns="146262" rIns="182828" bIns="146262" numCol="1" rtlCol="0" anchor="ctr" anchorCtr="0" compatLnSpc="1">
-            <a:prstTxWarp prst="textNoShape">
-              <a:avLst/>
-            </a:prstTxWarp>
-          </a:bodyPr>
-          <a:lstStyle/>
-          <a:p>
-            <a:pPr algn="ctr" defTabSz="932114" fontAlgn="base">
-              <a:spcBef>
-                <a:spcPct val="0"/>
-              </a:spcBef>
-              <a:spcAft>
-                <a:spcPct val="0"/>
-              </a:spcAft>
-            </a:pPr>
-            <a:r>
-              <a:rPr lang="en-US" sz="2000" dirty="0">
-                <a:gradFill>
-                  <a:gsLst>
-                    <a:gs pos="66372">
-                      <a:srgbClr val="141414"/>
-                    </a:gs>
-                    <a:gs pos="90000">
-                      <a:srgbClr val="141414"/>
-                    </a:gs>
-                  </a:gsLst>
-                  <a:lin ang="5400000" scaled="0"/>
-                </a:gradFill>
-                <a:latin typeface="Segoe UI Semilight"/>
-              </a:rPr>
-              <a:t>Entity Classes</a:t>
-            </a:r>
-          </a:p>
-        </p:txBody>
-      </p:sp>
-      <p:grpSp>
-        <p:nvGrpSpPr>
-          <p:cNvPr id="49" name="Group 48"/>
-          <p:cNvGrpSpPr/>
-          <p:nvPr/>
-        </p:nvGrpSpPr>
-        <p:grpSpPr>
-          <a:xfrm>
-            <a:off x="1222384" y="3314700"/>
-            <a:ext cx="3276599" cy="2697161"/>
-            <a:chOff x="1222384" y="3314700"/>
-            <a:chExt cx="3276599" cy="2697161"/>
-          </a:xfrm>
-        </p:grpSpPr>
-        <p:sp>
-          <p:nvSpPr>
-            <p:cNvPr id="33" name="Rectangle 32"/>
-            <p:cNvSpPr/>
-            <p:nvPr/>
-          </p:nvSpPr>
-          <p:spPr bwMode="auto">
-            <a:xfrm>
-              <a:off x="1222384" y="3314700"/>
-              <a:ext cx="3276599" cy="2697161"/>
-            </a:xfrm>
-            <a:prstGeom prst="rect">
-              <a:avLst/>
-            </a:prstGeom>
-            <a:solidFill>
-              <a:schemeClr val="accent4"/>
-            </a:solidFill>
-            <a:ln>
-              <a:noFill/>
-              <a:headEnd type="none" w="med" len="med"/>
-              <a:tailEnd type="none" w="med" len="med"/>
-            </a:ln>
-          </p:spPr>
-          <p:style>
-            <a:lnRef idx="2">
-              <a:schemeClr val="accent1">
-                <a:shade val="50000"/>
-              </a:schemeClr>
-            </a:lnRef>
-            <a:fillRef idx="1">
-              <a:schemeClr val="accent1"/>
-            </a:fillRef>
-            <a:effectRef idx="0">
-              <a:schemeClr val="accent1"/>
-            </a:effectRef>
-            <a:fontRef idx="minor">
-              <a:schemeClr val="lt1"/>
-            </a:fontRef>
-          </p:style>
-          <p:txBody>
-            <a:bodyPr vert="horz" wrap="square" lIns="182828" tIns="146262" rIns="182828" bIns="146262" numCol="1" rtlCol="0" anchor="t" anchorCtr="0" compatLnSpc="1">
-              <a:prstTxWarp prst="textNoShape">
-                <a:avLst/>
-              </a:prstTxWarp>
-            </a:bodyPr>
-            <a:lstStyle/>
-            <a:p>
-              <a:pPr algn="ctr" defTabSz="932114" fontAlgn="base">
-                <a:spcBef>
-                  <a:spcPct val="0"/>
-                </a:spcBef>
-                <a:spcAft>
-                  <a:spcPct val="0"/>
-                </a:spcAft>
-              </a:pPr>
-              <a:r>
-                <a:rPr lang="en-US" sz="2000" b="1" dirty="0">
-                  <a:gradFill>
-                    <a:gsLst>
-                      <a:gs pos="66372">
-                        <a:srgbClr val="141414"/>
-                      </a:gs>
-                      <a:gs pos="90000">
-                        <a:srgbClr val="141414"/>
-                      </a:gs>
-                    </a:gsLst>
-                    <a:lin ang="5400000" scaled="0"/>
-                  </a:gradFill>
-                </a:rPr>
-                <a:t>Context</a:t>
-              </a:r>
-            </a:p>
-          </p:txBody>
-        </p:sp>
-        <p:sp>
-          <p:nvSpPr>
-            <p:cNvPr id="24" name="Rectangle 23"/>
-            <p:cNvSpPr/>
-            <p:nvPr/>
-          </p:nvSpPr>
-          <p:spPr bwMode="auto">
-            <a:xfrm>
-              <a:off x="1488859" y="3940483"/>
-              <a:ext cx="2743648" cy="868434"/>
-            </a:xfrm>
-            <a:prstGeom prst="rect">
-              <a:avLst/>
-            </a:prstGeom>
-            <a:solidFill>
-              <a:schemeClr val="accent3"/>
-            </a:solidFill>
-            <a:ln>
-              <a:noFill/>
-              <a:headEnd type="none" w="med" len="med"/>
-              <a:tailEnd type="none" w="med" len="med"/>
-            </a:ln>
-          </p:spPr>
-          <p:style>
-            <a:lnRef idx="2">
-              <a:schemeClr val="accent1">
-                <a:shade val="50000"/>
-              </a:schemeClr>
-            </a:lnRef>
-            <a:fillRef idx="1">
-              <a:schemeClr val="accent1"/>
-            </a:fillRef>
-            <a:effectRef idx="0">
-              <a:schemeClr val="accent1"/>
-            </a:effectRef>
-            <a:fontRef idx="minor">
-              <a:schemeClr val="lt1"/>
-            </a:fontRef>
-          </p:style>
-          <p:txBody>
-            <a:bodyPr vert="horz" wrap="square" lIns="182828" tIns="146262" rIns="182828" bIns="146262" numCol="1" rtlCol="0" anchor="ctr" anchorCtr="0" compatLnSpc="1">
-              <a:prstTxWarp prst="textNoShape">
-                <a:avLst/>
-              </a:prstTxWarp>
-            </a:bodyPr>
-            <a:lstStyle/>
-            <a:p>
-              <a:pPr algn="ctr" defTabSz="932114" fontAlgn="base">
-                <a:spcBef>
-                  <a:spcPct val="0"/>
-                </a:spcBef>
-                <a:spcAft>
-                  <a:spcPct val="0"/>
-                </a:spcAft>
-              </a:pPr>
-              <a:r>
-                <a:rPr lang="en-US" sz="2000" dirty="0" err="1">
-                  <a:gradFill>
-                    <a:gsLst>
-                      <a:gs pos="66372">
-                        <a:srgbClr val="141414"/>
-                      </a:gs>
-                      <a:gs pos="90000">
-                        <a:srgbClr val="141414"/>
-                      </a:gs>
-                    </a:gsLst>
-                    <a:lin ang="5400000" scaled="0"/>
-                  </a:gradFill>
-                  <a:latin typeface="Segoe UI Semilight"/>
-                </a:rPr>
-                <a:t>DbSet</a:t>
-              </a:r>
-              <a:r>
-                <a:rPr lang="en-US" sz="2000" dirty="0">
-                  <a:gradFill>
-                    <a:gsLst>
-                      <a:gs pos="66372">
-                        <a:srgbClr val="141414"/>
-                      </a:gs>
-                      <a:gs pos="90000">
-                        <a:srgbClr val="141414"/>
-                      </a:gs>
-                    </a:gsLst>
-                    <a:lin ang="5400000" scaled="0"/>
-                  </a:gradFill>
-                  <a:latin typeface="Segoe UI Semilight"/>
-                </a:rPr>
-                <a:t> properties</a:t>
-              </a:r>
-            </a:p>
-          </p:txBody>
-        </p:sp>
-        <p:sp>
-          <p:nvSpPr>
-            <p:cNvPr id="25" name="Rectangle 24"/>
-            <p:cNvSpPr/>
-            <p:nvPr/>
-          </p:nvSpPr>
-          <p:spPr bwMode="auto">
-            <a:xfrm>
-              <a:off x="1488859" y="4884516"/>
-              <a:ext cx="2743649" cy="868434"/>
-            </a:xfrm>
-            <a:prstGeom prst="rect">
-              <a:avLst/>
-            </a:prstGeom>
-            <a:solidFill>
-              <a:schemeClr val="accent3"/>
-            </a:solidFill>
-            <a:ln>
-              <a:noFill/>
-              <a:headEnd type="none" w="med" len="med"/>
-              <a:tailEnd type="none" w="med" len="med"/>
-            </a:ln>
-          </p:spPr>
-          <p:style>
-            <a:lnRef idx="2">
-              <a:schemeClr val="accent1">
-                <a:shade val="50000"/>
-              </a:schemeClr>
-            </a:lnRef>
-            <a:fillRef idx="1">
-              <a:schemeClr val="accent1"/>
-            </a:fillRef>
-            <a:effectRef idx="0">
-              <a:schemeClr val="accent1"/>
-            </a:effectRef>
-            <a:fontRef idx="minor">
-              <a:schemeClr val="lt1"/>
-            </a:fontRef>
-          </p:style>
-          <p:txBody>
-            <a:bodyPr vert="horz" wrap="square" lIns="182828" tIns="146262" rIns="182828" bIns="146262" numCol="1" rtlCol="0" anchor="ctr" anchorCtr="0" compatLnSpc="1">
-              <a:prstTxWarp prst="textNoShape">
-                <a:avLst/>
-              </a:prstTxWarp>
-            </a:bodyPr>
-            <a:lstStyle/>
-            <a:p>
-              <a:pPr algn="ctr" defTabSz="932114" fontAlgn="base">
-                <a:spcBef>
-                  <a:spcPct val="0"/>
-                </a:spcBef>
-                <a:spcAft>
-                  <a:spcPct val="0"/>
-                </a:spcAft>
-              </a:pPr>
-              <a:r>
-                <a:rPr lang="en-US" sz="2000" dirty="0" err="1">
-                  <a:gradFill>
-                    <a:gsLst>
-                      <a:gs pos="66372">
-                        <a:srgbClr val="141414"/>
-                      </a:gs>
-                      <a:gs pos="90000">
-                        <a:srgbClr val="141414"/>
-                      </a:gs>
-                    </a:gsLst>
-                    <a:lin ang="5400000" scaled="0"/>
-                  </a:gradFill>
-                  <a:latin typeface="Segoe UI Semilight"/>
-                </a:rPr>
-                <a:t>OnModelCreating</a:t>
-              </a:r>
-              <a:endParaRPr lang="en-US" sz="2000" dirty="0">
-                <a:gradFill>
-                  <a:gsLst>
-                    <a:gs pos="66372">
-                      <a:srgbClr val="141414"/>
-                    </a:gs>
-                    <a:gs pos="90000">
-                      <a:srgbClr val="141414"/>
-                    </a:gs>
-                  </a:gsLst>
-                  <a:lin ang="5400000" scaled="0"/>
-                </a:gradFill>
-                <a:latin typeface="Segoe UI Semilight"/>
-              </a:endParaRPr>
-            </a:p>
-          </p:txBody>
-        </p:sp>
-      </p:grpSp>
-      <p:sp>
-        <p:nvSpPr>
-          <p:cNvPr id="26" name="Rectangle 25"/>
-          <p:cNvSpPr/>
-          <p:nvPr/>
-        </p:nvSpPr>
-        <p:spPr bwMode="auto">
-          <a:xfrm>
-            <a:off x="5002220" y="2125663"/>
-            <a:ext cx="2747963" cy="868434"/>
-          </a:xfrm>
-          <a:prstGeom prst="rect">
-            <a:avLst/>
-          </a:prstGeom>
-          <a:solidFill>
-            <a:schemeClr val="accent1"/>
-          </a:solidFill>
-          <a:ln>
-            <a:noFill/>
-            <a:headEnd type="none" w="med" len="med"/>
-            <a:tailEnd type="none" w="med" len="med"/>
-          </a:ln>
-        </p:spPr>
-        <p:style>
-          <a:lnRef idx="2">
-            <a:schemeClr val="accent1">
-              <a:shade val="50000"/>
-            </a:schemeClr>
-          </a:lnRef>
-          <a:fillRef idx="1">
-            <a:schemeClr val="accent1"/>
-          </a:fillRef>
-          <a:effectRef idx="0">
-            <a:schemeClr val="accent1"/>
-          </a:effectRef>
-          <a:fontRef idx="minor">
-            <a:schemeClr val="lt1"/>
-          </a:fontRef>
-        </p:style>
-        <p:txBody>
-          <a:bodyPr vert="horz" wrap="square" lIns="182828" tIns="146262" rIns="182828" bIns="146262" numCol="1" rtlCol="0" anchor="ctr" anchorCtr="0" compatLnSpc="1">
-            <a:prstTxWarp prst="textNoShape">
-              <a:avLst/>
-            </a:prstTxWarp>
-          </a:bodyPr>
-          <a:lstStyle/>
-          <a:p>
-            <a:pPr algn="ctr" defTabSz="932114" fontAlgn="base">
-              <a:spcBef>
-                <a:spcPct val="0"/>
-              </a:spcBef>
-              <a:spcAft>
-                <a:spcPct val="0"/>
-              </a:spcAft>
-            </a:pPr>
-            <a:r>
-              <a:rPr lang="en-US" sz="2000" dirty="0">
-                <a:gradFill>
-                  <a:gsLst>
-                    <a:gs pos="0">
-                      <a:srgbClr val="FFFFFF"/>
-                    </a:gs>
-                    <a:gs pos="100000">
-                      <a:srgbClr val="FFFFFF"/>
-                    </a:gs>
-                  </a:gsLst>
-                  <a:lin ang="5400000" scaled="0"/>
-                </a:gradFill>
-                <a:latin typeface="Segoe UI Semilight"/>
-              </a:rPr>
-              <a:t>Conventions</a:t>
-            </a:r>
-          </a:p>
-        </p:txBody>
-      </p:sp>
-      <p:sp>
-        <p:nvSpPr>
-          <p:cNvPr id="27" name="Rectangle 26"/>
-          <p:cNvSpPr/>
-          <p:nvPr/>
-        </p:nvSpPr>
-        <p:spPr bwMode="auto">
-          <a:xfrm>
-            <a:off x="5006535" y="3940558"/>
-            <a:ext cx="2743648" cy="868434"/>
-          </a:xfrm>
-          <a:prstGeom prst="rect">
-            <a:avLst/>
-          </a:prstGeom>
-          <a:solidFill>
-            <a:schemeClr val="accent1"/>
-          </a:solidFill>
-          <a:ln>
-            <a:noFill/>
-            <a:headEnd type="none" w="med" len="med"/>
-            <a:tailEnd type="none" w="med" len="med"/>
-          </a:ln>
-        </p:spPr>
-        <p:style>
-          <a:lnRef idx="2">
-            <a:schemeClr val="accent1">
-              <a:shade val="50000"/>
-            </a:schemeClr>
-          </a:lnRef>
-          <a:fillRef idx="1">
-            <a:schemeClr val="accent1"/>
-          </a:fillRef>
-          <a:effectRef idx="0">
-            <a:schemeClr val="accent1"/>
-          </a:effectRef>
-          <a:fontRef idx="minor">
-            <a:schemeClr val="lt1"/>
-          </a:fontRef>
-        </p:style>
-        <p:txBody>
-          <a:bodyPr vert="horz" wrap="square" lIns="182828" tIns="146262" rIns="182828" bIns="146262" numCol="1" rtlCol="0" anchor="ctr" anchorCtr="0" compatLnSpc="1">
-            <a:prstTxWarp prst="textNoShape">
-              <a:avLst/>
-            </a:prstTxWarp>
-          </a:bodyPr>
-          <a:lstStyle/>
-          <a:p>
-            <a:pPr algn="ctr" defTabSz="932114" fontAlgn="base">
-              <a:spcBef>
-                <a:spcPct val="0"/>
-              </a:spcBef>
-              <a:spcAft>
-                <a:spcPct val="0"/>
-              </a:spcAft>
-            </a:pPr>
-            <a:r>
-              <a:rPr lang="en-US" sz="2000" dirty="0" err="1">
-                <a:gradFill>
-                  <a:gsLst>
-                    <a:gs pos="0">
-                      <a:srgbClr val="FFFFFF"/>
-                    </a:gs>
-                    <a:gs pos="100000">
-                      <a:srgbClr val="FFFFFF"/>
-                    </a:gs>
-                  </a:gsLst>
-                  <a:lin ang="5400000" scaled="0"/>
-                </a:gradFill>
-                <a:latin typeface="Segoe UI Semilight"/>
-              </a:rPr>
-              <a:t>DbSet</a:t>
-            </a:r>
-            <a:r>
-              <a:rPr lang="en-US" sz="2000" dirty="0">
-                <a:gradFill>
-                  <a:gsLst>
-                    <a:gs pos="0">
-                      <a:srgbClr val="FFFFFF"/>
-                    </a:gs>
-                    <a:gs pos="100000">
-                      <a:srgbClr val="FFFFFF"/>
-                    </a:gs>
-                  </a:gsLst>
-                  <a:lin ang="5400000" scaled="0"/>
-                </a:gradFill>
-                <a:latin typeface="Segoe UI Semilight"/>
-              </a:rPr>
-              <a:t> Discovery</a:t>
-            </a:r>
-          </a:p>
-        </p:txBody>
-      </p:sp>
-      <p:sp>
-        <p:nvSpPr>
-          <p:cNvPr id="28" name="Rectangle 27"/>
-          <p:cNvSpPr/>
-          <p:nvPr/>
-        </p:nvSpPr>
-        <p:spPr bwMode="auto">
-          <a:xfrm>
-            <a:off x="5006534" y="4884591"/>
-            <a:ext cx="2743649" cy="868434"/>
-          </a:xfrm>
-          <a:prstGeom prst="rect">
-            <a:avLst/>
-          </a:prstGeom>
-          <a:solidFill>
-            <a:schemeClr val="accent1"/>
-          </a:solidFill>
-          <a:ln>
-            <a:noFill/>
-            <a:headEnd type="none" w="med" len="med"/>
-            <a:tailEnd type="none" w="med" len="med"/>
-          </a:ln>
-        </p:spPr>
-        <p:style>
-          <a:lnRef idx="2">
-            <a:schemeClr val="accent1">
-              <a:shade val="50000"/>
-            </a:schemeClr>
-          </a:lnRef>
-          <a:fillRef idx="1">
-            <a:schemeClr val="accent1"/>
-          </a:fillRef>
-          <a:effectRef idx="0">
-            <a:schemeClr val="accent1"/>
-          </a:effectRef>
-          <a:fontRef idx="minor">
-            <a:schemeClr val="lt1"/>
-          </a:fontRef>
-        </p:style>
-        <p:txBody>
-          <a:bodyPr vert="horz" wrap="square" lIns="182828" tIns="146262" rIns="182828" bIns="146262" numCol="1" rtlCol="0" anchor="ctr" anchorCtr="0" compatLnSpc="1">
-            <a:prstTxWarp prst="textNoShape">
-              <a:avLst/>
-            </a:prstTxWarp>
-          </a:bodyPr>
-          <a:lstStyle/>
-          <a:p>
-            <a:pPr algn="ctr" defTabSz="932114" fontAlgn="base">
-              <a:spcBef>
-                <a:spcPct val="0"/>
-              </a:spcBef>
-              <a:spcAft>
-                <a:spcPct val="0"/>
-              </a:spcAft>
-            </a:pPr>
-            <a:r>
-              <a:rPr lang="en-US" sz="2000" dirty="0">
-                <a:gradFill>
-                  <a:gsLst>
-                    <a:gs pos="0">
-                      <a:srgbClr val="FFFFFF"/>
-                    </a:gs>
-                    <a:gs pos="100000">
-                      <a:srgbClr val="FFFFFF"/>
-                    </a:gs>
-                  </a:gsLst>
-                  <a:lin ang="5400000" scaled="0"/>
-                </a:gradFill>
-                <a:latin typeface="Segoe UI Semilight"/>
-              </a:rPr>
-              <a:t>Configuration</a:t>
-            </a:r>
-          </a:p>
-        </p:txBody>
-      </p:sp>
-      <p:sp>
-        <p:nvSpPr>
-          <p:cNvPr id="29" name="Rectangle 28"/>
-          <p:cNvSpPr/>
-          <p:nvPr/>
-        </p:nvSpPr>
-        <p:spPr bwMode="auto">
-          <a:xfrm>
-            <a:off x="8511728" y="3940558"/>
-            <a:ext cx="2743648" cy="868434"/>
-          </a:xfrm>
-          <a:prstGeom prst="rect">
-            <a:avLst/>
-          </a:prstGeom>
-          <a:solidFill>
-            <a:schemeClr val="accent2"/>
-          </a:solidFill>
-          <a:ln>
-            <a:noFill/>
-            <a:headEnd type="none" w="med" len="med"/>
-            <a:tailEnd type="none" w="med" len="med"/>
-          </a:ln>
-        </p:spPr>
-        <p:style>
-          <a:lnRef idx="2">
-            <a:schemeClr val="accent1">
-              <a:shade val="50000"/>
-            </a:schemeClr>
-          </a:lnRef>
-          <a:fillRef idx="1">
-            <a:schemeClr val="accent1"/>
-          </a:fillRef>
-          <a:effectRef idx="0">
-            <a:schemeClr val="accent1"/>
-          </a:effectRef>
-          <a:fontRef idx="minor">
-            <a:schemeClr val="lt1"/>
-          </a:fontRef>
-        </p:style>
-        <p:txBody>
-          <a:bodyPr vert="horz" wrap="square" lIns="182828" tIns="146262" rIns="182828" bIns="146262" numCol="1" rtlCol="0" anchor="ctr" anchorCtr="0" compatLnSpc="1">
-            <a:prstTxWarp prst="textNoShape">
-              <a:avLst/>
-            </a:prstTxWarp>
-          </a:bodyPr>
-          <a:lstStyle/>
-          <a:p>
-            <a:pPr algn="ctr" defTabSz="932114" fontAlgn="base">
-              <a:spcBef>
-                <a:spcPct val="0"/>
-              </a:spcBef>
-              <a:spcAft>
-                <a:spcPct val="0"/>
-              </a:spcAft>
-            </a:pPr>
-            <a:r>
-              <a:rPr lang="en-US" sz="2000" dirty="0">
-                <a:gradFill>
-                  <a:gsLst>
-                    <a:gs pos="0">
-                      <a:srgbClr val="FFFFFF"/>
-                    </a:gs>
-                    <a:gs pos="100000">
-                      <a:srgbClr val="FFFFFF"/>
-                    </a:gs>
-                  </a:gsLst>
-                  <a:lin ang="5400000" scaled="0"/>
-                </a:gradFill>
-                <a:latin typeface="Segoe UI Semilight"/>
-              </a:rPr>
-              <a:t>Model</a:t>
-            </a:r>
-          </a:p>
-        </p:txBody>
-      </p:sp>
-      <p:cxnSp>
-        <p:nvCxnSpPr>
-          <p:cNvPr id="31" name="Straight Arrow Connector 30"/>
-          <p:cNvCxnSpPr>
-            <a:stCxn id="23" idx="3"/>
-            <a:endCxn id="26" idx="1"/>
-          </p:cNvCxnSpPr>
-          <p:nvPr/>
-        </p:nvCxnSpPr>
-        <p:spPr>
-          <a:xfrm>
-            <a:off x="4240675" y="2559880"/>
-            <a:ext cx="761545" cy="0"/>
-          </a:xfrm>
-          <a:prstGeom prst="straightConnector1">
-            <a:avLst/>
-          </a:prstGeom>
-          <a:ln w="31750">
-            <a:solidFill>
-              <a:schemeClr val="accent6">
-                <a:lumMod val="60000"/>
-                <a:lumOff val="40000"/>
-              </a:schemeClr>
-            </a:solidFill>
-            <a:headEnd type="none"/>
-            <a:tailEnd type="triangle"/>
-          </a:ln>
-        </p:spPr>
-        <p:style>
-          <a:lnRef idx="1">
-            <a:schemeClr val="accent1"/>
-          </a:lnRef>
-          <a:fillRef idx="0">
-            <a:schemeClr val="accent1"/>
-          </a:fillRef>
-          <a:effectRef idx="0">
-            <a:schemeClr val="accent1"/>
-          </a:effectRef>
-          <a:fontRef idx="minor">
-            <a:schemeClr val="tx1"/>
-          </a:fontRef>
-        </p:style>
-      </p:cxnSp>
-      <p:cxnSp>
-        <p:nvCxnSpPr>
-          <p:cNvPr id="36" name="Straight Arrow Connector 35"/>
-          <p:cNvCxnSpPr>
-            <a:stCxn id="24" idx="3"/>
-            <a:endCxn id="27" idx="1"/>
-          </p:cNvCxnSpPr>
-          <p:nvPr/>
-        </p:nvCxnSpPr>
-        <p:spPr>
-          <a:xfrm>
-            <a:off x="4232507" y="4374700"/>
-            <a:ext cx="774028" cy="75"/>
-          </a:xfrm>
-          <a:prstGeom prst="straightConnector1">
-            <a:avLst/>
-          </a:prstGeom>
-          <a:ln w="31750">
-            <a:solidFill>
-              <a:schemeClr val="accent6">
-                <a:lumMod val="60000"/>
-                <a:lumOff val="40000"/>
-              </a:schemeClr>
-            </a:solidFill>
-            <a:headEnd type="none"/>
-            <a:tailEnd type="triangle"/>
-          </a:ln>
-        </p:spPr>
-        <p:style>
-          <a:lnRef idx="1">
-            <a:schemeClr val="accent1"/>
-          </a:lnRef>
-          <a:fillRef idx="0">
-            <a:schemeClr val="accent1"/>
-          </a:fillRef>
-          <a:effectRef idx="0">
-            <a:schemeClr val="accent1"/>
-          </a:effectRef>
-          <a:fontRef idx="minor">
-            <a:schemeClr val="tx1"/>
-          </a:fontRef>
-        </p:style>
-      </p:cxnSp>
-      <p:cxnSp>
-        <p:nvCxnSpPr>
-          <p:cNvPr id="37" name="Straight Arrow Connector 36"/>
-          <p:cNvCxnSpPr>
-            <a:stCxn id="25" idx="3"/>
-            <a:endCxn id="28" idx="1"/>
-          </p:cNvCxnSpPr>
-          <p:nvPr/>
-        </p:nvCxnSpPr>
-        <p:spPr>
-          <a:xfrm>
-            <a:off x="4232508" y="5318733"/>
-            <a:ext cx="774026" cy="75"/>
-          </a:xfrm>
-          <a:prstGeom prst="straightConnector1">
-            <a:avLst/>
-          </a:prstGeom>
-          <a:ln w="31750">
-            <a:solidFill>
-              <a:schemeClr val="accent6">
-                <a:lumMod val="60000"/>
-                <a:lumOff val="40000"/>
-              </a:schemeClr>
-            </a:solidFill>
-            <a:headEnd type="none"/>
-            <a:tailEnd type="triangle"/>
-          </a:ln>
-        </p:spPr>
-        <p:style>
-          <a:lnRef idx="1">
-            <a:schemeClr val="accent1"/>
-          </a:lnRef>
-          <a:fillRef idx="0">
-            <a:schemeClr val="accent1"/>
-          </a:fillRef>
-          <a:effectRef idx="0">
-            <a:schemeClr val="accent1"/>
-          </a:effectRef>
-          <a:fontRef idx="minor">
-            <a:schemeClr val="tx1"/>
-          </a:fontRef>
-        </p:style>
-      </p:cxnSp>
-      <p:cxnSp>
-        <p:nvCxnSpPr>
-          <p:cNvPr id="38" name="Straight Arrow Connector 37"/>
-          <p:cNvCxnSpPr>
-            <a:stCxn id="27" idx="3"/>
-            <a:endCxn id="29" idx="1"/>
-          </p:cNvCxnSpPr>
-          <p:nvPr/>
-        </p:nvCxnSpPr>
-        <p:spPr>
-          <a:xfrm>
-            <a:off x="7750183" y="4374775"/>
-            <a:ext cx="761545" cy="0"/>
-          </a:xfrm>
-          <a:prstGeom prst="straightConnector1">
-            <a:avLst/>
-          </a:prstGeom>
-          <a:ln w="31750">
-            <a:solidFill>
-              <a:schemeClr val="accent6">
-                <a:lumMod val="60000"/>
-                <a:lumOff val="40000"/>
-              </a:schemeClr>
-            </a:solidFill>
-            <a:headEnd type="none"/>
-            <a:tailEnd type="triangle"/>
-          </a:ln>
-        </p:spPr>
-        <p:style>
-          <a:lnRef idx="1">
-            <a:schemeClr val="accent1"/>
-          </a:lnRef>
-          <a:fillRef idx="0">
-            <a:schemeClr val="accent1"/>
-          </a:fillRef>
-          <a:effectRef idx="0">
-            <a:schemeClr val="accent1"/>
-          </a:effectRef>
-          <a:fontRef idx="minor">
-            <a:schemeClr val="tx1"/>
-          </a:fontRef>
-        </p:style>
-      </p:cxnSp>
-      <p:cxnSp>
-        <p:nvCxnSpPr>
-          <p:cNvPr id="46" name="Elbow Connector 45"/>
-          <p:cNvCxnSpPr>
-            <a:stCxn id="26" idx="3"/>
-            <a:endCxn id="29" idx="0"/>
-          </p:cNvCxnSpPr>
-          <p:nvPr/>
-        </p:nvCxnSpPr>
-        <p:spPr>
-          <a:xfrm>
-            <a:off x="7750183" y="2559880"/>
-            <a:ext cx="2133369" cy="1380678"/>
-          </a:xfrm>
-          <a:prstGeom prst="bentConnector2">
-            <a:avLst/>
-          </a:prstGeom>
-          <a:ln w="31750">
-            <a:solidFill>
-              <a:schemeClr val="accent6">
-                <a:lumMod val="60000"/>
-                <a:lumOff val="40000"/>
-              </a:schemeClr>
-            </a:solidFill>
-            <a:headEnd type="none"/>
-            <a:tailEnd type="triangle"/>
-          </a:ln>
-        </p:spPr>
-        <p:style>
-          <a:lnRef idx="1">
-            <a:schemeClr val="accent1"/>
-          </a:lnRef>
-          <a:fillRef idx="0">
-            <a:schemeClr val="accent1"/>
-          </a:fillRef>
-          <a:effectRef idx="0">
-            <a:schemeClr val="accent1"/>
-          </a:effectRef>
-          <a:fontRef idx="minor">
-            <a:schemeClr val="tx1"/>
-          </a:fontRef>
-        </p:style>
-      </p:cxnSp>
-      <p:cxnSp>
-        <p:nvCxnSpPr>
-          <p:cNvPr id="48" name="Elbow Connector 47"/>
-          <p:cNvCxnSpPr>
-            <a:stCxn id="28" idx="3"/>
-            <a:endCxn id="29" idx="2"/>
-          </p:cNvCxnSpPr>
-          <p:nvPr/>
-        </p:nvCxnSpPr>
-        <p:spPr>
-          <a:xfrm flipV="1">
-            <a:off x="7750183" y="4808992"/>
-            <a:ext cx="2133369" cy="509816"/>
-          </a:xfrm>
-          <a:prstGeom prst="bentConnector2">
-            <a:avLst/>
-          </a:prstGeom>
-          <a:ln w="31750">
-            <a:solidFill>
-              <a:schemeClr val="accent6">
-                <a:lumMod val="60000"/>
-                <a:lumOff val="40000"/>
-              </a:schemeClr>
-            </a:solidFill>
-            <a:headEnd type="none"/>
-            <a:tailEnd type="triangle"/>
-          </a:ln>
-        </p:spPr>
-        <p:style>
-          <a:lnRef idx="1">
-            <a:schemeClr val="accent1"/>
-          </a:lnRef>
-          <a:fillRef idx="0">
-            <a:schemeClr val="accent1"/>
-          </a:fillRef>
-          <a:effectRef idx="0">
-            <a:schemeClr val="accent1"/>
-          </a:effectRef>
-          <a:fontRef idx="minor">
-            <a:schemeClr val="tx1"/>
-          </a:fontRef>
-        </p:style>
-      </p:cxnSp>
-    </p:spTree>
-    <p:extLst>
-      <p:ext uri="{BB962C8B-B14F-4D97-AF65-F5344CB8AC3E}">
-        <p14:creationId xmlns:p14="http://schemas.microsoft.com/office/powerpoint/2010/main" val="2182711221"/>
-      </p:ext>
-    </p:extLst>
-  </p:cSld>
-  <p:clrMapOvr>
-    <a:masterClrMapping/>
-  </p:clrMapOvr>
-  <mc:AlternateContent xmlns:mc="http://schemas.openxmlformats.org/markup-compatibility/2006" xmlns:p14="http://schemas.microsoft.com/office/powerpoint/2010/main">
-    <mc:Choice Requires="p14">
-      <p:transition spd="med" p14:dur="700">
-        <p:fade/>
-      </p:transition>
-    </mc:Choice>
-    <mc:Fallback xmlns="">
-      <p:transition spd="med">
-        <p:fade/>
-      </p:transition>
-    </mc:Fallback>
-  </mc:AlternateContent>
-  <p:timing>
-    <p:tnLst>
-      <p:par>
-        <p:cTn id="1" dur="indefinite" restart="never" nodeType="tmRoot">
-          <p:childTnLst>
-            <p:seq concurrent="1" nextAc="seek">
-              <p:cTn id="2" dur="indefinite" nodeType="mainSeq">
-                <p:childTnLst>
-                  <p:par>
-                    <p:cTn id="3" fill="hold">
-                      <p:stCondLst>
-                        <p:cond delay="indefinite"/>
-                      </p:stCondLst>
-                      <p:childTnLst>
-                        <p:par>
-                          <p:cTn id="4" fill="hold">
-                            <p:stCondLst>
-                              <p:cond delay="0"/>
-                            </p:stCondLst>
-                            <p:childTnLst>
-                              <p:par>
-                                <p:cTn id="5" presetID="10" presetClass="entr" presetSubtype="0" fill="hold" grpId="0" nodeType="clickEffect">
-                                  <p:stCondLst>
-                                    <p:cond delay="0"/>
-                                  </p:stCondLst>
-                                  <p:childTnLst>
-                                    <p:set>
-                                      <p:cBhvr>
-                                        <p:cTn id="6" dur="1" fill="hold">
-                                          <p:stCondLst>
-                                            <p:cond delay="0"/>
-                                          </p:stCondLst>
-                                        </p:cTn>
-                                        <p:tgtEl>
-                                          <p:spTgt spid="23"/>
-                                        </p:tgtEl>
-                                        <p:attrNameLst>
-                                          <p:attrName>style.visibility</p:attrName>
-                                        </p:attrNameLst>
-                                      </p:cBhvr>
-                                      <p:to>
-                                        <p:strVal val="visible"/>
-                                      </p:to>
-                                    </p:set>
-                                    <p:animEffect transition="in" filter="fade">
-                                      <p:cBhvr>
-                                        <p:cTn id="7" dur="500"/>
-                                        <p:tgtEl>
-                                          <p:spTgt spid="23"/>
-                                        </p:tgtEl>
-                                      </p:cBhvr>
-                                    </p:animEffect>
-                                  </p:childTnLst>
-                                </p:cTn>
-                              </p:par>
-                            </p:childTnLst>
-                          </p:cTn>
-                        </p:par>
-                      </p:childTnLst>
-                    </p:cTn>
-                  </p:par>
-                  <p:par>
-                    <p:cTn id="8" fill="hold">
-                      <p:stCondLst>
-                        <p:cond delay="indefinite"/>
-                      </p:stCondLst>
-                      <p:childTnLst>
-                        <p:par>
-                          <p:cTn id="9" fill="hold">
-                            <p:stCondLst>
-                              <p:cond delay="0"/>
-                            </p:stCondLst>
-                            <p:childTnLst>
-                              <p:par>
-                                <p:cTn id="10" presetID="10" presetClass="entr" presetSubtype="0" fill="hold" nodeType="clickEffect">
-                                  <p:stCondLst>
-                                    <p:cond delay="0"/>
-                                  </p:stCondLst>
-                                  <p:childTnLst>
-                                    <p:set>
-                                      <p:cBhvr>
-                                        <p:cTn id="11" dur="1" fill="hold">
-                                          <p:stCondLst>
-                                            <p:cond delay="0"/>
-                                          </p:stCondLst>
-                                        </p:cTn>
-                                        <p:tgtEl>
-                                          <p:spTgt spid="49"/>
-                                        </p:tgtEl>
-                                        <p:attrNameLst>
-                                          <p:attrName>style.visibility</p:attrName>
-                                        </p:attrNameLst>
-                                      </p:cBhvr>
-                                      <p:to>
-                                        <p:strVal val="visible"/>
-                                      </p:to>
-                                    </p:set>
-                                    <p:animEffect transition="in" filter="fade">
-                                      <p:cBhvr>
-                                        <p:cTn id="12" dur="500"/>
-                                        <p:tgtEl>
-                                          <p:spTgt spid="49"/>
-                                        </p:tgtEl>
-                                      </p:cBhvr>
-                                    </p:animEffect>
-                                  </p:childTnLst>
-                                </p:cTn>
-                              </p:par>
-                            </p:childTnLst>
-                          </p:cTn>
-                        </p:par>
-                      </p:childTnLst>
-                    </p:cTn>
-                  </p:par>
-                  <p:par>
-                    <p:cTn id="13" fill="hold">
-                      <p:stCondLst>
-                        <p:cond delay="indefinite"/>
-                      </p:stCondLst>
-                      <p:childTnLst>
-                        <p:par>
-                          <p:cTn id="14" fill="hold">
-                            <p:stCondLst>
-                              <p:cond delay="0"/>
-                            </p:stCondLst>
-                            <p:childTnLst>
-                              <p:par>
-                                <p:cTn id="15" presetID="10" presetClass="entr" presetSubtype="0" fill="hold" grpId="0" nodeType="clickEffect">
-                                  <p:stCondLst>
-                                    <p:cond delay="0"/>
-                                  </p:stCondLst>
-                                  <p:childTnLst>
-                                    <p:set>
-                                      <p:cBhvr>
-                                        <p:cTn id="16" dur="1" fill="hold">
-                                          <p:stCondLst>
-                                            <p:cond delay="0"/>
-                                          </p:stCondLst>
-                                        </p:cTn>
-                                        <p:tgtEl>
-                                          <p:spTgt spid="26"/>
-                                        </p:tgtEl>
-                                        <p:attrNameLst>
-                                          <p:attrName>style.visibility</p:attrName>
-                                        </p:attrNameLst>
-                                      </p:cBhvr>
-                                      <p:to>
-                                        <p:strVal val="visible"/>
-                                      </p:to>
-                                    </p:set>
-                                    <p:animEffect transition="in" filter="fade">
-                                      <p:cBhvr>
-                                        <p:cTn id="17" dur="500"/>
-                                        <p:tgtEl>
-                                          <p:spTgt spid="26"/>
-                                        </p:tgtEl>
-                                      </p:cBhvr>
-                                    </p:animEffect>
-                                  </p:childTnLst>
-                                </p:cTn>
-                              </p:par>
-                            </p:childTnLst>
-                          </p:cTn>
-                        </p:par>
-                        <p:par>
-                          <p:cTn id="18" fill="hold">
-                            <p:stCondLst>
-                              <p:cond delay="500"/>
-                            </p:stCondLst>
-                            <p:childTnLst>
-                              <p:par>
-                                <p:cTn id="19" presetID="22" presetClass="entr" presetSubtype="8" fill="hold" nodeType="afterEffect">
-                                  <p:stCondLst>
-                                    <p:cond delay="0"/>
-                                  </p:stCondLst>
-                                  <p:childTnLst>
-                                    <p:set>
-                                      <p:cBhvr>
-                                        <p:cTn id="20" dur="1" fill="hold">
-                                          <p:stCondLst>
-                                            <p:cond delay="0"/>
-                                          </p:stCondLst>
-                                        </p:cTn>
-                                        <p:tgtEl>
-                                          <p:spTgt spid="31"/>
-                                        </p:tgtEl>
-                                        <p:attrNameLst>
-                                          <p:attrName>style.visibility</p:attrName>
-                                        </p:attrNameLst>
-                                      </p:cBhvr>
-                                      <p:to>
-                                        <p:strVal val="visible"/>
-                                      </p:to>
-                                    </p:set>
-                                    <p:animEffect transition="in" filter="wipe(left)">
-                                      <p:cBhvr>
-                                        <p:cTn id="21" dur="500"/>
-                                        <p:tgtEl>
-                                          <p:spTgt spid="31"/>
-                                        </p:tgtEl>
-                                      </p:cBhvr>
-                                    </p:animEffect>
-                                  </p:childTnLst>
-                                </p:cTn>
-                              </p:par>
-                            </p:childTnLst>
-                          </p:cTn>
-                        </p:par>
-                      </p:childTnLst>
-                    </p:cTn>
-                  </p:par>
-                  <p:par>
-                    <p:cTn id="22" fill="hold">
-                      <p:stCondLst>
-                        <p:cond delay="indefinite"/>
-                      </p:stCondLst>
-                      <p:childTnLst>
-                        <p:par>
-                          <p:cTn id="23" fill="hold">
-                            <p:stCondLst>
-                              <p:cond delay="0"/>
-                            </p:stCondLst>
-                            <p:childTnLst>
-                              <p:par>
-                                <p:cTn id="24" presetID="10" presetClass="entr" presetSubtype="0" fill="hold" grpId="0" nodeType="clickEffect">
-                                  <p:stCondLst>
-                                    <p:cond delay="0"/>
-                                  </p:stCondLst>
-                                  <p:childTnLst>
-                                    <p:set>
-                                      <p:cBhvr>
-                                        <p:cTn id="25" dur="1" fill="hold">
-                                          <p:stCondLst>
-                                            <p:cond delay="0"/>
-                                          </p:stCondLst>
-                                        </p:cTn>
-                                        <p:tgtEl>
-                                          <p:spTgt spid="27"/>
-                                        </p:tgtEl>
-                                        <p:attrNameLst>
-                                          <p:attrName>style.visibility</p:attrName>
-                                        </p:attrNameLst>
-                                      </p:cBhvr>
-                                      <p:to>
-                                        <p:strVal val="visible"/>
-                                      </p:to>
-                                    </p:set>
-                                    <p:animEffect transition="in" filter="fade">
-                                      <p:cBhvr>
-                                        <p:cTn id="26" dur="500"/>
-                                        <p:tgtEl>
-                                          <p:spTgt spid="27"/>
-                                        </p:tgtEl>
-                                      </p:cBhvr>
-                                    </p:animEffect>
-                                  </p:childTnLst>
-                                </p:cTn>
-                              </p:par>
-                            </p:childTnLst>
-                          </p:cTn>
-                        </p:par>
-                        <p:par>
-                          <p:cTn id="27" fill="hold">
-                            <p:stCondLst>
-                              <p:cond delay="500"/>
-                            </p:stCondLst>
-                            <p:childTnLst>
-                              <p:par>
-                                <p:cTn id="28" presetID="22" presetClass="entr" presetSubtype="8" fill="hold" nodeType="afterEffect">
-                                  <p:stCondLst>
-                                    <p:cond delay="0"/>
-                                  </p:stCondLst>
-                                  <p:childTnLst>
-                                    <p:set>
-                                      <p:cBhvr>
-                                        <p:cTn id="29" dur="1" fill="hold">
-                                          <p:stCondLst>
-                                            <p:cond delay="0"/>
-                                          </p:stCondLst>
-                                        </p:cTn>
-                                        <p:tgtEl>
-                                          <p:spTgt spid="36"/>
-                                        </p:tgtEl>
-                                        <p:attrNameLst>
-                                          <p:attrName>style.visibility</p:attrName>
-                                        </p:attrNameLst>
-                                      </p:cBhvr>
-                                      <p:to>
-                                        <p:strVal val="visible"/>
-                                      </p:to>
-                                    </p:set>
-                                    <p:animEffect transition="in" filter="wipe(left)">
-                                      <p:cBhvr>
-                                        <p:cTn id="30" dur="500"/>
-                                        <p:tgtEl>
-                                          <p:spTgt spid="36"/>
-                                        </p:tgtEl>
-                                      </p:cBhvr>
-                                    </p:animEffect>
-                                  </p:childTnLst>
-                                </p:cTn>
-                              </p:par>
-                            </p:childTnLst>
-                          </p:cTn>
-                        </p:par>
-                      </p:childTnLst>
-                    </p:cTn>
-                  </p:par>
-                  <p:par>
-                    <p:cTn id="31" fill="hold">
-                      <p:stCondLst>
-                        <p:cond delay="indefinite"/>
-                      </p:stCondLst>
-                      <p:childTnLst>
-                        <p:par>
-                          <p:cTn id="32" fill="hold">
-                            <p:stCondLst>
-                              <p:cond delay="0"/>
-                            </p:stCondLst>
-                            <p:childTnLst>
-                              <p:par>
-                                <p:cTn id="33" presetID="10" presetClass="entr" presetSubtype="0" fill="hold" grpId="0" nodeType="clickEffect">
-                                  <p:stCondLst>
-                                    <p:cond delay="0"/>
-                                  </p:stCondLst>
-                                  <p:childTnLst>
-                                    <p:set>
-                                      <p:cBhvr>
-                                        <p:cTn id="34" dur="1" fill="hold">
-                                          <p:stCondLst>
-                                            <p:cond delay="0"/>
-                                          </p:stCondLst>
-                                        </p:cTn>
-                                        <p:tgtEl>
-                                          <p:spTgt spid="28"/>
-                                        </p:tgtEl>
-                                        <p:attrNameLst>
-                                          <p:attrName>style.visibility</p:attrName>
-                                        </p:attrNameLst>
-                                      </p:cBhvr>
-                                      <p:to>
-                                        <p:strVal val="visible"/>
-                                      </p:to>
-                                    </p:set>
-                                    <p:animEffect transition="in" filter="fade">
-                                      <p:cBhvr>
-                                        <p:cTn id="35" dur="500"/>
-                                        <p:tgtEl>
-                                          <p:spTgt spid="28"/>
-                                        </p:tgtEl>
-                                      </p:cBhvr>
-                                    </p:animEffect>
-                                  </p:childTnLst>
-                                </p:cTn>
-                              </p:par>
-                            </p:childTnLst>
-                          </p:cTn>
-                        </p:par>
-                        <p:par>
-                          <p:cTn id="36" fill="hold">
-                            <p:stCondLst>
-                              <p:cond delay="500"/>
-                            </p:stCondLst>
-                            <p:childTnLst>
-                              <p:par>
-                                <p:cTn id="37" presetID="22" presetClass="entr" presetSubtype="8" fill="hold" nodeType="afterEffect">
-                                  <p:stCondLst>
-                                    <p:cond delay="0"/>
-                                  </p:stCondLst>
-                                  <p:childTnLst>
-                                    <p:set>
-                                      <p:cBhvr>
-                                        <p:cTn id="38" dur="1" fill="hold">
-                                          <p:stCondLst>
-                                            <p:cond delay="0"/>
-                                          </p:stCondLst>
-                                        </p:cTn>
-                                        <p:tgtEl>
-                                          <p:spTgt spid="37"/>
-                                        </p:tgtEl>
-                                        <p:attrNameLst>
-                                          <p:attrName>style.visibility</p:attrName>
-                                        </p:attrNameLst>
-                                      </p:cBhvr>
-                                      <p:to>
-                                        <p:strVal val="visible"/>
-                                      </p:to>
-                                    </p:set>
-                                    <p:animEffect transition="in" filter="wipe(left)">
-                                      <p:cBhvr>
-                                        <p:cTn id="39" dur="500"/>
-                                        <p:tgtEl>
-                                          <p:spTgt spid="37"/>
-                                        </p:tgtEl>
-                                      </p:cBhvr>
-                                    </p:animEffect>
-                                  </p:childTnLst>
-                                </p:cTn>
-                              </p:par>
-                            </p:childTnLst>
-                          </p:cTn>
-                        </p:par>
-                      </p:childTnLst>
-                    </p:cTn>
-                  </p:par>
-                  <p:par>
-                    <p:cTn id="40" fill="hold">
-                      <p:stCondLst>
-                        <p:cond delay="indefinite"/>
-                      </p:stCondLst>
-                      <p:childTnLst>
-                        <p:par>
-                          <p:cTn id="41" fill="hold">
-                            <p:stCondLst>
-                              <p:cond delay="0"/>
-                            </p:stCondLst>
-                            <p:childTnLst>
-                              <p:par>
-                                <p:cTn id="42" presetID="10" presetClass="entr" presetSubtype="0" fill="hold" grpId="0" nodeType="clickEffect">
-                                  <p:stCondLst>
-                                    <p:cond delay="0"/>
-                                  </p:stCondLst>
-                                  <p:childTnLst>
-                                    <p:set>
-                                      <p:cBhvr>
-                                        <p:cTn id="43" dur="1" fill="hold">
-                                          <p:stCondLst>
-                                            <p:cond delay="0"/>
-                                          </p:stCondLst>
-                                        </p:cTn>
-                                        <p:tgtEl>
-                                          <p:spTgt spid="29"/>
-                                        </p:tgtEl>
-                                        <p:attrNameLst>
-                                          <p:attrName>style.visibility</p:attrName>
-                                        </p:attrNameLst>
-                                      </p:cBhvr>
-                                      <p:to>
-                                        <p:strVal val="visible"/>
-                                      </p:to>
-                                    </p:set>
-                                    <p:animEffect transition="in" filter="fade">
-                                      <p:cBhvr>
-                                        <p:cTn id="44" dur="500"/>
-                                        <p:tgtEl>
-                                          <p:spTgt spid="29"/>
-                                        </p:tgtEl>
-                                      </p:cBhvr>
-                                    </p:animEffect>
-                                  </p:childTnLst>
-                                </p:cTn>
-                              </p:par>
-                            </p:childTnLst>
-                          </p:cTn>
-                        </p:par>
-                        <p:par>
-                          <p:cTn id="45" fill="hold">
-                            <p:stCondLst>
-                              <p:cond delay="500"/>
-                            </p:stCondLst>
-                            <p:childTnLst>
-                              <p:par>
-                                <p:cTn id="46" presetID="22" presetClass="entr" presetSubtype="1" fill="hold" nodeType="afterEffect">
-                                  <p:stCondLst>
-                                    <p:cond delay="0"/>
-                                  </p:stCondLst>
-                                  <p:childTnLst>
-                                    <p:set>
-                                      <p:cBhvr>
-                                        <p:cTn id="47" dur="1" fill="hold">
-                                          <p:stCondLst>
-                                            <p:cond delay="0"/>
-                                          </p:stCondLst>
-                                        </p:cTn>
-                                        <p:tgtEl>
-                                          <p:spTgt spid="46"/>
-                                        </p:tgtEl>
-                                        <p:attrNameLst>
-                                          <p:attrName>style.visibility</p:attrName>
-                                        </p:attrNameLst>
-                                      </p:cBhvr>
-                                      <p:to>
-                                        <p:strVal val="visible"/>
-                                      </p:to>
-                                    </p:set>
-                                    <p:animEffect transition="in" filter="wipe(up)">
-                                      <p:cBhvr>
-                                        <p:cTn id="48" dur="500"/>
-                                        <p:tgtEl>
-                                          <p:spTgt spid="46"/>
-                                        </p:tgtEl>
-                                      </p:cBhvr>
-                                    </p:animEffect>
-                                  </p:childTnLst>
-                                </p:cTn>
-                              </p:par>
-                              <p:par>
-                                <p:cTn id="49" presetID="22" presetClass="entr" presetSubtype="8" fill="hold" nodeType="withEffect">
-                                  <p:stCondLst>
-                                    <p:cond delay="0"/>
-                                  </p:stCondLst>
-                                  <p:childTnLst>
-                                    <p:set>
-                                      <p:cBhvr>
-                                        <p:cTn id="50" dur="1" fill="hold">
-                                          <p:stCondLst>
-                                            <p:cond delay="0"/>
-                                          </p:stCondLst>
-                                        </p:cTn>
-                                        <p:tgtEl>
-                                          <p:spTgt spid="38"/>
-                                        </p:tgtEl>
-                                        <p:attrNameLst>
-                                          <p:attrName>style.visibility</p:attrName>
-                                        </p:attrNameLst>
-                                      </p:cBhvr>
-                                      <p:to>
-                                        <p:strVal val="visible"/>
-                                      </p:to>
-                                    </p:set>
-                                    <p:animEffect transition="in" filter="wipe(left)">
-                                      <p:cBhvr>
-                                        <p:cTn id="51" dur="500"/>
-                                        <p:tgtEl>
-                                          <p:spTgt spid="38"/>
-                                        </p:tgtEl>
-                                      </p:cBhvr>
-                                    </p:animEffect>
-                                  </p:childTnLst>
-                                </p:cTn>
-                              </p:par>
-                              <p:par>
-                                <p:cTn id="52" presetID="22" presetClass="entr" presetSubtype="4" fill="hold" nodeType="withEffect">
-                                  <p:stCondLst>
-                                    <p:cond delay="0"/>
-                                  </p:stCondLst>
-                                  <p:childTnLst>
-                                    <p:set>
-                                      <p:cBhvr>
-                                        <p:cTn id="53" dur="1" fill="hold">
-                                          <p:stCondLst>
-                                            <p:cond delay="0"/>
-                                          </p:stCondLst>
-                                        </p:cTn>
-                                        <p:tgtEl>
-                                          <p:spTgt spid="48"/>
-                                        </p:tgtEl>
-                                        <p:attrNameLst>
-                                          <p:attrName>style.visibility</p:attrName>
-                                        </p:attrNameLst>
-                                      </p:cBhvr>
-                                      <p:to>
-                                        <p:strVal val="visible"/>
-                                      </p:to>
-                                    </p:set>
-                                    <p:animEffect transition="in" filter="wipe(down)">
-                                      <p:cBhvr>
-                                        <p:cTn id="54" dur="500"/>
-                                        <p:tgtEl>
-                                          <p:spTgt spid="48"/>
-                                        </p:tgtEl>
-                                      </p:cBhvr>
-                                    </p:animEffect>
-                                  </p:childTnLst>
-                                </p:cTn>
-                              </p:par>
-                            </p:childTnLst>
-                          </p:cTn>
-                        </p:par>
-                      </p:childTnLst>
-                    </p:cTn>
-                  </p:par>
-                </p:childTnLst>
-              </p:cTn>
-              <p:prevCondLst>
-                <p:cond evt="onPrev" delay="0">
-                  <p:tgtEl>
-                    <p:sldTgt/>
-                  </p:tgtEl>
-                </p:cond>
-              </p:prevCondLst>
-              <p:nextCondLst>
-                <p:cond evt="onNext" delay="0">
-                  <p:tgtEl>
-                    <p:sldTgt/>
-                  </p:tgtEl>
-                </p:cond>
-              </p:nextCondLst>
-            </p:seq>
-          </p:childTnLst>
-        </p:cTn>
-      </p:par>
-    </p:tnLst>
-    <p:bldLst>
-      <p:bldP spid="23" grpId="0" animBg="1"/>
-      <p:bldP spid="26" grpId="0" animBg="1"/>
-      <p:bldP spid="27" grpId="0" animBg="1"/>
-      <p:bldP spid="28" grpId="0" animBg="1"/>
-      <p:bldP spid="29" grpId="0" animBg="1"/>
-    </p:bldLst>
-  </p:timing>
-</p:sld>
-</file>
-
-<file path=ppt/slides/slide26.xml><?xml version="1.0" encoding="utf-8"?>
-<p:sld xmlns:a="http://schemas.openxmlformats.org/drawingml/2006/main" xmlns:r="http://schemas.openxmlformats.org/officeDocument/2006/relationships" xmlns:p="http://schemas.openxmlformats.org/presentationml/2006/main">
-  <p:cSld>
-    <p:spTree>
-      <p:nvGrpSpPr>
-        <p:cNvPr id="1" name=""/>
-        <p:cNvGrpSpPr/>
-        <p:nvPr/>
-      </p:nvGrpSpPr>
-      <p:grpSpPr>
-        <a:xfrm>
-          <a:off x="0" y="0"/>
-          <a:ext cx="0" cy="0"/>
-          <a:chOff x="0" y="0"/>
-          <a:chExt cx="0" cy="0"/>
-        </a:xfrm>
-      </p:grpSpPr>
-      <p:sp>
-        <p:nvSpPr>
-          <p:cNvPr id="2" name="Title 1"/>
-          <p:cNvSpPr>
-            <a:spLocks noGrp="1"/>
-          </p:cNvSpPr>
-          <p:nvPr>
-            <p:ph type="title"/>
-          </p:nvPr>
-        </p:nvSpPr>
-        <p:spPr/>
-        <p:txBody>
-          <a:bodyPr/>
-          <a:lstStyle/>
-          <a:p>
-            <a:r>
-              <a:rPr lang="en-US" dirty="0"/>
-              <a:t>EF Core model building pipeline</a:t>
-            </a:r>
-          </a:p>
-        </p:txBody>
-      </p:sp>
-      <p:sp>
-        <p:nvSpPr>
-          <p:cNvPr id="23" name="Rectangle 22"/>
-          <p:cNvSpPr/>
-          <p:nvPr/>
-        </p:nvSpPr>
-        <p:spPr bwMode="auto">
-          <a:xfrm>
-            <a:off x="1492712" y="2125663"/>
-            <a:ext cx="2747963" cy="868434"/>
-          </a:xfrm>
-          <a:prstGeom prst="rect">
-            <a:avLst/>
-          </a:prstGeom>
-          <a:solidFill>
-            <a:schemeClr val="accent3"/>
-          </a:solidFill>
-          <a:ln>
-            <a:noFill/>
-            <a:headEnd type="none" w="med" len="med"/>
-            <a:tailEnd type="none" w="med" len="med"/>
-          </a:ln>
-        </p:spPr>
-        <p:style>
-          <a:lnRef idx="2">
-            <a:schemeClr val="accent1">
-              <a:shade val="50000"/>
-            </a:schemeClr>
-          </a:lnRef>
-          <a:fillRef idx="1">
-            <a:schemeClr val="accent1"/>
-          </a:fillRef>
-          <a:effectRef idx="0">
-            <a:schemeClr val="accent1"/>
-          </a:effectRef>
-          <a:fontRef idx="minor">
-            <a:schemeClr val="lt1"/>
-          </a:fontRef>
-        </p:style>
-        <p:txBody>
-          <a:bodyPr vert="horz" wrap="square" lIns="182828" tIns="146262" rIns="182828" bIns="146262" numCol="1" rtlCol="0" anchor="ctr" anchorCtr="0" compatLnSpc="1">
-            <a:prstTxWarp prst="textNoShape">
-              <a:avLst/>
-            </a:prstTxWarp>
-          </a:bodyPr>
-          <a:lstStyle/>
-          <a:p>
-            <a:pPr algn="ctr" defTabSz="932114" fontAlgn="base">
-              <a:spcBef>
-                <a:spcPct val="0"/>
-              </a:spcBef>
-              <a:spcAft>
-                <a:spcPct val="0"/>
-              </a:spcAft>
-            </a:pPr>
-            <a:r>
-              <a:rPr lang="en-US" sz="2000" dirty="0">
-                <a:gradFill>
-                  <a:gsLst>
-                    <a:gs pos="66372">
-                      <a:srgbClr val="141414"/>
-                    </a:gs>
-                    <a:gs pos="90000">
-                      <a:srgbClr val="141414"/>
-                    </a:gs>
-                  </a:gsLst>
-                  <a:lin ang="5400000" scaled="0"/>
-                </a:gradFill>
-                <a:latin typeface="Segoe UI Semilight"/>
-              </a:rPr>
-              <a:t>Entity Classes</a:t>
-            </a:r>
-          </a:p>
-        </p:txBody>
-      </p:sp>
-      <p:grpSp>
-        <p:nvGrpSpPr>
-          <p:cNvPr id="49" name="Group 48"/>
-          <p:cNvGrpSpPr/>
-          <p:nvPr/>
-        </p:nvGrpSpPr>
-        <p:grpSpPr>
-          <a:xfrm>
-            <a:off x="1222384" y="3314700"/>
-            <a:ext cx="3276599" cy="2697161"/>
-            <a:chOff x="1222384" y="3314700"/>
-            <a:chExt cx="3276599" cy="2697161"/>
-          </a:xfrm>
-        </p:grpSpPr>
-        <p:sp>
-          <p:nvSpPr>
-            <p:cNvPr id="33" name="Rectangle 32"/>
-            <p:cNvSpPr/>
-            <p:nvPr/>
-          </p:nvSpPr>
-          <p:spPr bwMode="auto">
-            <a:xfrm>
-              <a:off x="1222384" y="3314700"/>
-              <a:ext cx="3276599" cy="2697161"/>
-            </a:xfrm>
-            <a:prstGeom prst="rect">
-              <a:avLst/>
-            </a:prstGeom>
-            <a:solidFill>
-              <a:schemeClr val="accent4"/>
-            </a:solidFill>
-            <a:ln>
-              <a:noFill/>
-              <a:headEnd type="none" w="med" len="med"/>
-              <a:tailEnd type="none" w="med" len="med"/>
-            </a:ln>
-          </p:spPr>
-          <p:style>
-            <a:lnRef idx="2">
-              <a:schemeClr val="accent1">
-                <a:shade val="50000"/>
-              </a:schemeClr>
-            </a:lnRef>
-            <a:fillRef idx="1">
-              <a:schemeClr val="accent1"/>
-            </a:fillRef>
-            <a:effectRef idx="0">
-              <a:schemeClr val="accent1"/>
-            </a:effectRef>
-            <a:fontRef idx="minor">
-              <a:schemeClr val="lt1"/>
-            </a:fontRef>
-          </p:style>
-          <p:txBody>
-            <a:bodyPr vert="horz" wrap="square" lIns="182828" tIns="146262" rIns="182828" bIns="146262" numCol="1" rtlCol="0" anchor="t" anchorCtr="0" compatLnSpc="1">
-              <a:prstTxWarp prst="textNoShape">
-                <a:avLst/>
-              </a:prstTxWarp>
-            </a:bodyPr>
-            <a:lstStyle/>
-            <a:p>
-              <a:pPr algn="ctr" defTabSz="932114" fontAlgn="base">
-                <a:spcBef>
-                  <a:spcPct val="0"/>
-                </a:spcBef>
-                <a:spcAft>
-                  <a:spcPct val="0"/>
-                </a:spcAft>
-              </a:pPr>
-              <a:r>
-                <a:rPr lang="en-US" sz="2000" b="1" dirty="0">
-                  <a:gradFill>
-                    <a:gsLst>
-                      <a:gs pos="66372">
-                        <a:srgbClr val="141414"/>
-                      </a:gs>
-                      <a:gs pos="90000">
-                        <a:srgbClr val="141414"/>
-                      </a:gs>
-                    </a:gsLst>
-                    <a:lin ang="5400000" scaled="0"/>
-                  </a:gradFill>
-                </a:rPr>
-                <a:t>Context</a:t>
-              </a:r>
-            </a:p>
-          </p:txBody>
-        </p:sp>
-        <p:sp>
-          <p:nvSpPr>
-            <p:cNvPr id="24" name="Rectangle 23"/>
-            <p:cNvSpPr/>
-            <p:nvPr/>
-          </p:nvSpPr>
-          <p:spPr bwMode="auto">
-            <a:xfrm>
-              <a:off x="1488859" y="3940483"/>
-              <a:ext cx="2743648" cy="868434"/>
-            </a:xfrm>
-            <a:prstGeom prst="rect">
-              <a:avLst/>
-            </a:prstGeom>
-            <a:solidFill>
-              <a:schemeClr val="accent3"/>
-            </a:solidFill>
-            <a:ln>
-              <a:noFill/>
-              <a:headEnd type="none" w="med" len="med"/>
-              <a:tailEnd type="none" w="med" len="med"/>
-            </a:ln>
-          </p:spPr>
-          <p:style>
-            <a:lnRef idx="2">
-              <a:schemeClr val="accent1">
-                <a:shade val="50000"/>
-              </a:schemeClr>
-            </a:lnRef>
-            <a:fillRef idx="1">
-              <a:schemeClr val="accent1"/>
-            </a:fillRef>
-            <a:effectRef idx="0">
-              <a:schemeClr val="accent1"/>
-            </a:effectRef>
-            <a:fontRef idx="minor">
-              <a:schemeClr val="lt1"/>
-            </a:fontRef>
-          </p:style>
-          <p:txBody>
-            <a:bodyPr vert="horz" wrap="square" lIns="182828" tIns="146262" rIns="182828" bIns="146262" numCol="1" rtlCol="0" anchor="ctr" anchorCtr="0" compatLnSpc="1">
-              <a:prstTxWarp prst="textNoShape">
-                <a:avLst/>
-              </a:prstTxWarp>
-            </a:bodyPr>
-            <a:lstStyle/>
-            <a:p>
-              <a:pPr algn="ctr" defTabSz="932114" fontAlgn="base">
-                <a:spcBef>
-                  <a:spcPct val="0"/>
-                </a:spcBef>
-                <a:spcAft>
-                  <a:spcPct val="0"/>
-                </a:spcAft>
-              </a:pPr>
-              <a:r>
-                <a:rPr lang="en-US" sz="2000" dirty="0" err="1">
-                  <a:gradFill>
-                    <a:gsLst>
-                      <a:gs pos="66372">
-                        <a:srgbClr val="141414"/>
-                      </a:gs>
-                      <a:gs pos="90000">
-                        <a:srgbClr val="141414"/>
-                      </a:gs>
-                    </a:gsLst>
-                    <a:lin ang="5400000" scaled="0"/>
-                  </a:gradFill>
-                  <a:latin typeface="Segoe UI Semilight"/>
-                </a:rPr>
-                <a:t>DbSet</a:t>
-              </a:r>
-              <a:r>
-                <a:rPr lang="en-US" sz="2000" dirty="0">
-                  <a:gradFill>
-                    <a:gsLst>
-                      <a:gs pos="66372">
-                        <a:srgbClr val="141414"/>
-                      </a:gs>
-                      <a:gs pos="90000">
-                        <a:srgbClr val="141414"/>
-                      </a:gs>
-                    </a:gsLst>
-                    <a:lin ang="5400000" scaled="0"/>
-                  </a:gradFill>
-                  <a:latin typeface="Segoe UI Semilight"/>
-                </a:rPr>
-                <a:t> properties</a:t>
-              </a:r>
-            </a:p>
-          </p:txBody>
-        </p:sp>
-        <p:sp>
-          <p:nvSpPr>
-            <p:cNvPr id="25" name="Rectangle 24"/>
-            <p:cNvSpPr/>
-            <p:nvPr/>
-          </p:nvSpPr>
-          <p:spPr bwMode="auto">
-            <a:xfrm>
-              <a:off x="1488859" y="4884516"/>
-              <a:ext cx="2743649" cy="868434"/>
-            </a:xfrm>
-            <a:prstGeom prst="rect">
-              <a:avLst/>
-            </a:prstGeom>
-            <a:solidFill>
-              <a:schemeClr val="accent3"/>
-            </a:solidFill>
-            <a:ln>
-              <a:noFill/>
-              <a:headEnd type="none" w="med" len="med"/>
-              <a:tailEnd type="none" w="med" len="med"/>
-            </a:ln>
-          </p:spPr>
-          <p:style>
-            <a:lnRef idx="2">
-              <a:schemeClr val="accent1">
-                <a:shade val="50000"/>
-              </a:schemeClr>
-            </a:lnRef>
-            <a:fillRef idx="1">
-              <a:schemeClr val="accent1"/>
-            </a:fillRef>
-            <a:effectRef idx="0">
-              <a:schemeClr val="accent1"/>
-            </a:effectRef>
-            <a:fontRef idx="minor">
-              <a:schemeClr val="lt1"/>
-            </a:fontRef>
-          </p:style>
-          <p:txBody>
-            <a:bodyPr vert="horz" wrap="square" lIns="182828" tIns="146262" rIns="182828" bIns="146262" numCol="1" rtlCol="0" anchor="ctr" anchorCtr="0" compatLnSpc="1">
-              <a:prstTxWarp prst="textNoShape">
-                <a:avLst/>
-              </a:prstTxWarp>
-            </a:bodyPr>
-            <a:lstStyle/>
-            <a:p>
-              <a:pPr algn="ctr" defTabSz="932114" fontAlgn="base">
-                <a:spcBef>
-                  <a:spcPct val="0"/>
-                </a:spcBef>
-                <a:spcAft>
-                  <a:spcPct val="0"/>
-                </a:spcAft>
-              </a:pPr>
-              <a:r>
-                <a:rPr lang="en-US" sz="2000" dirty="0" err="1">
-                  <a:gradFill>
-                    <a:gsLst>
-                      <a:gs pos="66372">
-                        <a:srgbClr val="141414"/>
-                      </a:gs>
-                      <a:gs pos="90000">
-                        <a:srgbClr val="141414"/>
-                      </a:gs>
-                    </a:gsLst>
-                    <a:lin ang="5400000" scaled="0"/>
-                  </a:gradFill>
-                  <a:latin typeface="Segoe UI Semilight"/>
-                </a:rPr>
-                <a:t>OnModelCreating</a:t>
-              </a:r>
-              <a:endParaRPr lang="en-US" sz="2000" dirty="0">
-                <a:gradFill>
-                  <a:gsLst>
-                    <a:gs pos="66372">
-                      <a:srgbClr val="141414"/>
-                    </a:gs>
-                    <a:gs pos="90000">
-                      <a:srgbClr val="141414"/>
-                    </a:gs>
-                  </a:gsLst>
-                  <a:lin ang="5400000" scaled="0"/>
-                </a:gradFill>
-                <a:latin typeface="Segoe UI Semilight"/>
-              </a:endParaRPr>
-            </a:p>
-          </p:txBody>
-        </p:sp>
-      </p:grpSp>
-      <p:sp>
-        <p:nvSpPr>
-          <p:cNvPr id="26" name="Rectangle 25"/>
-          <p:cNvSpPr/>
-          <p:nvPr/>
-        </p:nvSpPr>
-        <p:spPr bwMode="auto">
-          <a:xfrm>
-            <a:off x="5002220" y="2125663"/>
-            <a:ext cx="2747963" cy="868434"/>
-          </a:xfrm>
-          <a:prstGeom prst="rect">
-            <a:avLst/>
-          </a:prstGeom>
-          <a:solidFill>
-            <a:schemeClr val="accent1"/>
-          </a:solidFill>
-          <a:ln>
-            <a:noFill/>
-            <a:headEnd type="none" w="med" len="med"/>
-            <a:tailEnd type="none" w="med" len="med"/>
-          </a:ln>
-        </p:spPr>
-        <p:style>
-          <a:lnRef idx="2">
-            <a:schemeClr val="accent1">
-              <a:shade val="50000"/>
-            </a:schemeClr>
-          </a:lnRef>
-          <a:fillRef idx="1">
-            <a:schemeClr val="accent1"/>
-          </a:fillRef>
-          <a:effectRef idx="0">
-            <a:schemeClr val="accent1"/>
-          </a:effectRef>
-          <a:fontRef idx="minor">
-            <a:schemeClr val="lt1"/>
-          </a:fontRef>
-        </p:style>
-        <p:txBody>
-          <a:bodyPr vert="horz" wrap="square" lIns="182828" tIns="146262" rIns="182828" bIns="146262" numCol="1" rtlCol="0" anchor="ctr" anchorCtr="0" compatLnSpc="1">
-            <a:prstTxWarp prst="textNoShape">
-              <a:avLst/>
-            </a:prstTxWarp>
-          </a:bodyPr>
-          <a:lstStyle/>
-          <a:p>
-            <a:pPr algn="ctr" defTabSz="932114" fontAlgn="base">
-              <a:spcBef>
-                <a:spcPct val="0"/>
-              </a:spcBef>
-              <a:spcAft>
-                <a:spcPct val="0"/>
-              </a:spcAft>
-            </a:pPr>
-            <a:r>
-              <a:rPr lang="en-US" sz="2000" dirty="0">
-                <a:gradFill>
-                  <a:gsLst>
-                    <a:gs pos="0">
-                      <a:srgbClr val="FFFFFF"/>
-                    </a:gs>
-                    <a:gs pos="100000">
-                      <a:srgbClr val="FFFFFF"/>
-                    </a:gs>
-                  </a:gsLst>
-                  <a:lin ang="5400000" scaled="0"/>
-                </a:gradFill>
-                <a:latin typeface="Segoe UI Semilight"/>
-              </a:rPr>
-              <a:t>Conventions</a:t>
-            </a:r>
-          </a:p>
-        </p:txBody>
-      </p:sp>
-      <p:sp>
-        <p:nvSpPr>
-          <p:cNvPr id="27" name="Rectangle 26"/>
-          <p:cNvSpPr/>
-          <p:nvPr/>
-        </p:nvSpPr>
-        <p:spPr bwMode="auto">
-          <a:xfrm>
-            <a:off x="5006535" y="3940558"/>
-            <a:ext cx="2743648" cy="868434"/>
-          </a:xfrm>
-          <a:prstGeom prst="rect">
-            <a:avLst/>
-          </a:prstGeom>
-          <a:solidFill>
-            <a:schemeClr val="accent1"/>
-          </a:solidFill>
-          <a:ln>
-            <a:noFill/>
-            <a:headEnd type="none" w="med" len="med"/>
-            <a:tailEnd type="none" w="med" len="med"/>
-          </a:ln>
-        </p:spPr>
-        <p:style>
-          <a:lnRef idx="2">
-            <a:schemeClr val="accent1">
-              <a:shade val="50000"/>
-            </a:schemeClr>
-          </a:lnRef>
-          <a:fillRef idx="1">
-            <a:schemeClr val="accent1"/>
-          </a:fillRef>
-          <a:effectRef idx="0">
-            <a:schemeClr val="accent1"/>
-          </a:effectRef>
-          <a:fontRef idx="minor">
-            <a:schemeClr val="lt1"/>
-          </a:fontRef>
-        </p:style>
-        <p:txBody>
-          <a:bodyPr vert="horz" wrap="square" lIns="182828" tIns="146262" rIns="182828" bIns="146262" numCol="1" rtlCol="0" anchor="ctr" anchorCtr="0" compatLnSpc="1">
-            <a:prstTxWarp prst="textNoShape">
-              <a:avLst/>
-            </a:prstTxWarp>
-          </a:bodyPr>
-          <a:lstStyle/>
-          <a:p>
-            <a:pPr algn="ctr" defTabSz="932114" fontAlgn="base">
-              <a:spcBef>
-                <a:spcPct val="0"/>
-              </a:spcBef>
-              <a:spcAft>
-                <a:spcPct val="0"/>
-              </a:spcAft>
-            </a:pPr>
-            <a:r>
-              <a:rPr lang="en-US" sz="2000" dirty="0" err="1">
-                <a:gradFill>
-                  <a:gsLst>
-                    <a:gs pos="0">
-                      <a:srgbClr val="FFFFFF"/>
-                    </a:gs>
-                    <a:gs pos="100000">
-                      <a:srgbClr val="FFFFFF"/>
-                    </a:gs>
-                  </a:gsLst>
-                  <a:lin ang="5400000" scaled="0"/>
-                </a:gradFill>
-                <a:latin typeface="Segoe UI Semilight"/>
-              </a:rPr>
-              <a:t>DbSet</a:t>
-            </a:r>
-            <a:r>
-              <a:rPr lang="en-US" sz="2000" dirty="0">
-                <a:gradFill>
-                  <a:gsLst>
-                    <a:gs pos="0">
-                      <a:srgbClr val="FFFFFF"/>
-                    </a:gs>
-                    <a:gs pos="100000">
-                      <a:srgbClr val="FFFFFF"/>
-                    </a:gs>
-                  </a:gsLst>
-                  <a:lin ang="5400000" scaled="0"/>
-                </a:gradFill>
-                <a:latin typeface="Segoe UI Semilight"/>
-              </a:rPr>
-              <a:t> Discovery</a:t>
-            </a:r>
-          </a:p>
-        </p:txBody>
-      </p:sp>
-      <p:cxnSp>
-        <p:nvCxnSpPr>
-          <p:cNvPr id="31" name="Straight Arrow Connector 30"/>
-          <p:cNvCxnSpPr>
-            <a:stCxn id="23" idx="3"/>
-            <a:endCxn id="26" idx="1"/>
-          </p:cNvCxnSpPr>
-          <p:nvPr/>
-        </p:nvCxnSpPr>
-        <p:spPr>
-          <a:xfrm>
-            <a:off x="4240675" y="2559880"/>
-            <a:ext cx="761545" cy="0"/>
-          </a:xfrm>
-          <a:prstGeom prst="straightConnector1">
-            <a:avLst/>
-          </a:prstGeom>
-          <a:ln w="31750">
-            <a:solidFill>
-              <a:schemeClr val="accent6">
-                <a:lumMod val="60000"/>
-                <a:lumOff val="40000"/>
-              </a:schemeClr>
-            </a:solidFill>
-            <a:headEnd type="none"/>
-            <a:tailEnd type="triangle"/>
-          </a:ln>
-        </p:spPr>
-        <p:style>
-          <a:lnRef idx="1">
-            <a:schemeClr val="accent1"/>
-          </a:lnRef>
-          <a:fillRef idx="0">
-            <a:schemeClr val="accent1"/>
-          </a:fillRef>
-          <a:effectRef idx="0">
-            <a:schemeClr val="accent1"/>
-          </a:effectRef>
-          <a:fontRef idx="minor">
-            <a:schemeClr val="tx1"/>
-          </a:fontRef>
-        </p:style>
-      </p:cxnSp>
-      <p:cxnSp>
-        <p:nvCxnSpPr>
-          <p:cNvPr id="36" name="Straight Arrow Connector 35"/>
-          <p:cNvCxnSpPr>
-            <a:stCxn id="24" idx="3"/>
-            <a:endCxn id="27" idx="1"/>
-          </p:cNvCxnSpPr>
-          <p:nvPr/>
-        </p:nvCxnSpPr>
-        <p:spPr>
-          <a:xfrm>
-            <a:off x="4232507" y="4374700"/>
-            <a:ext cx="774028" cy="75"/>
-          </a:xfrm>
-          <a:prstGeom prst="straightConnector1">
-            <a:avLst/>
-          </a:prstGeom>
-          <a:ln w="31750">
-            <a:solidFill>
-              <a:schemeClr val="accent6">
-                <a:lumMod val="60000"/>
-                <a:lumOff val="40000"/>
-              </a:schemeClr>
-            </a:solidFill>
-            <a:headEnd type="none"/>
-            <a:tailEnd type="triangle"/>
-          </a:ln>
-        </p:spPr>
-        <p:style>
-          <a:lnRef idx="1">
-            <a:schemeClr val="accent1"/>
-          </a:lnRef>
-          <a:fillRef idx="0">
-            <a:schemeClr val="accent1"/>
-          </a:fillRef>
-          <a:effectRef idx="0">
-            <a:schemeClr val="accent1"/>
-          </a:effectRef>
-          <a:fontRef idx="minor">
-            <a:schemeClr val="tx1"/>
-          </a:fontRef>
-        </p:style>
-      </p:cxnSp>
-      <p:cxnSp>
-        <p:nvCxnSpPr>
-          <p:cNvPr id="38" name="Straight Arrow Connector 37"/>
-          <p:cNvCxnSpPr>
-            <a:stCxn id="27" idx="3"/>
-            <a:endCxn id="29" idx="1"/>
-          </p:cNvCxnSpPr>
-          <p:nvPr/>
-        </p:nvCxnSpPr>
-        <p:spPr>
-          <a:xfrm>
-            <a:off x="7750183" y="4374775"/>
-            <a:ext cx="761545" cy="0"/>
-          </a:xfrm>
-          <a:prstGeom prst="straightConnector1">
-            <a:avLst/>
-          </a:prstGeom>
-          <a:ln w="31750">
-            <a:solidFill>
-              <a:schemeClr val="accent6">
-                <a:lumMod val="60000"/>
-                <a:lumOff val="40000"/>
-              </a:schemeClr>
-            </a:solidFill>
-            <a:headEnd type="none"/>
-            <a:tailEnd type="triangle"/>
-          </a:ln>
-        </p:spPr>
-        <p:style>
-          <a:lnRef idx="1">
-            <a:schemeClr val="accent1"/>
-          </a:lnRef>
-          <a:fillRef idx="0">
-            <a:schemeClr val="accent1"/>
-          </a:fillRef>
-          <a:effectRef idx="0">
-            <a:schemeClr val="accent1"/>
-          </a:effectRef>
-          <a:fontRef idx="minor">
-            <a:schemeClr val="tx1"/>
-          </a:fontRef>
-        </p:style>
-      </p:cxnSp>
-      <p:cxnSp>
-        <p:nvCxnSpPr>
-          <p:cNvPr id="46" name="Elbow Connector 45"/>
-          <p:cNvCxnSpPr>
-            <a:stCxn id="26" idx="3"/>
-            <a:endCxn id="29" idx="0"/>
-          </p:cNvCxnSpPr>
-          <p:nvPr/>
-        </p:nvCxnSpPr>
-        <p:spPr>
-          <a:xfrm>
-            <a:off x="7750183" y="2559880"/>
-            <a:ext cx="2133369" cy="1380678"/>
-          </a:xfrm>
-          <a:prstGeom prst="bentConnector2">
-            <a:avLst/>
-          </a:prstGeom>
-          <a:ln w="31750">
-            <a:solidFill>
-              <a:schemeClr val="accent6">
-                <a:lumMod val="60000"/>
-                <a:lumOff val="40000"/>
-              </a:schemeClr>
-            </a:solidFill>
-            <a:headEnd type="none"/>
-            <a:tailEnd type="triangle"/>
-          </a:ln>
-        </p:spPr>
-        <p:style>
-          <a:lnRef idx="1">
-            <a:schemeClr val="accent1"/>
-          </a:lnRef>
-          <a:fillRef idx="0">
-            <a:schemeClr val="accent1"/>
-          </a:fillRef>
-          <a:effectRef idx="0">
-            <a:schemeClr val="accent1"/>
-          </a:effectRef>
-          <a:fontRef idx="minor">
-            <a:schemeClr val="tx1"/>
-          </a:fontRef>
-        </p:style>
-      </p:cxnSp>
-      <p:cxnSp>
-        <p:nvCxnSpPr>
-          <p:cNvPr id="4" name="Elbow Connector 3"/>
-          <p:cNvCxnSpPr/>
-          <p:nvPr/>
-        </p:nvCxnSpPr>
-        <p:spPr>
-          <a:xfrm rot="5400000">
-            <a:off x="6723294" y="2158401"/>
-            <a:ext cx="669470" cy="5651045"/>
-          </a:xfrm>
-          <a:prstGeom prst="bentConnector2">
-            <a:avLst/>
-          </a:prstGeom>
-          <a:ln w="31750">
-            <a:solidFill>
-              <a:schemeClr val="accent6">
-                <a:lumMod val="60000"/>
-                <a:lumOff val="40000"/>
-              </a:schemeClr>
-            </a:solidFill>
-            <a:headEnd type="none"/>
-            <a:tailEnd type="triangle"/>
-          </a:ln>
-        </p:spPr>
-        <p:style>
-          <a:lnRef idx="1">
-            <a:schemeClr val="accent1"/>
-          </a:lnRef>
-          <a:fillRef idx="0">
-            <a:schemeClr val="accent1"/>
-          </a:fillRef>
-          <a:effectRef idx="0">
-            <a:schemeClr val="accent1"/>
-          </a:effectRef>
-          <a:fontRef idx="minor">
-            <a:schemeClr val="tx1"/>
-          </a:fontRef>
-        </p:style>
-      </p:cxnSp>
-      <p:sp>
-        <p:nvSpPr>
-          <p:cNvPr id="29" name="Rectangle 28"/>
-          <p:cNvSpPr/>
-          <p:nvPr/>
-        </p:nvSpPr>
-        <p:spPr bwMode="auto">
-          <a:xfrm>
-            <a:off x="8511728" y="3940558"/>
-            <a:ext cx="2743648" cy="868434"/>
-          </a:xfrm>
-          <a:prstGeom prst="rect">
-            <a:avLst/>
-          </a:prstGeom>
-          <a:solidFill>
-            <a:schemeClr val="accent2"/>
-          </a:solidFill>
-          <a:ln>
-            <a:noFill/>
-            <a:headEnd type="none" w="med" len="med"/>
-            <a:tailEnd type="none" w="med" len="med"/>
-          </a:ln>
-        </p:spPr>
-        <p:style>
-          <a:lnRef idx="2">
-            <a:schemeClr val="accent1">
-              <a:shade val="50000"/>
-            </a:schemeClr>
-          </a:lnRef>
-          <a:fillRef idx="1">
-            <a:schemeClr val="accent1"/>
-          </a:fillRef>
-          <a:effectRef idx="0">
-            <a:schemeClr val="accent1"/>
-          </a:effectRef>
-          <a:fontRef idx="minor">
-            <a:schemeClr val="lt1"/>
-          </a:fontRef>
-        </p:style>
-        <p:txBody>
-          <a:bodyPr vert="horz" wrap="square" lIns="182828" tIns="146262" rIns="182828" bIns="146262" numCol="1" rtlCol="0" anchor="ctr" anchorCtr="0" compatLnSpc="1">
-            <a:prstTxWarp prst="textNoShape">
-              <a:avLst/>
-            </a:prstTxWarp>
-          </a:bodyPr>
-          <a:lstStyle/>
-          <a:p>
-            <a:pPr algn="ctr" defTabSz="932114" fontAlgn="base">
-              <a:spcBef>
-                <a:spcPct val="0"/>
-              </a:spcBef>
-              <a:spcAft>
-                <a:spcPct val="0"/>
-              </a:spcAft>
-            </a:pPr>
-            <a:r>
-              <a:rPr lang="en-US" sz="2000" dirty="0">
-                <a:gradFill>
-                  <a:gsLst>
-                    <a:gs pos="0">
-                      <a:srgbClr val="FFFFFF"/>
-                    </a:gs>
-                    <a:gs pos="100000">
-                      <a:srgbClr val="FFFFFF"/>
-                    </a:gs>
-                  </a:gsLst>
-                  <a:lin ang="5400000" scaled="0"/>
-                </a:gradFill>
-                <a:latin typeface="Segoe UI Semilight"/>
-              </a:rPr>
-              <a:t>Model</a:t>
-            </a:r>
-          </a:p>
-        </p:txBody>
-      </p:sp>
-    </p:spTree>
-    <p:extLst>
-      <p:ext uri="{BB962C8B-B14F-4D97-AF65-F5344CB8AC3E}">
-        <p14:creationId xmlns:p14="http://schemas.microsoft.com/office/powerpoint/2010/main" val="1097606676"/>
-      </p:ext>
-    </p:extLst>
-  </p:cSld>
-  <p:clrMapOvr>
-    <a:masterClrMapping/>
-  </p:clrMapOvr>
-  <mc:AlternateContent xmlns:mc="http://schemas.openxmlformats.org/markup-compatibility/2006" xmlns:p14="http://schemas.microsoft.com/office/powerpoint/2010/main">
-    <mc:Choice Requires="p14">
-      <p:transition spd="med" p14:dur="700">
-        <p:fade/>
-      </p:transition>
-    </mc:Choice>
-    <mc:Fallback xmlns="">
-      <p:transition spd="med">
-        <p:fade/>
-      </p:transition>
-    </mc:Fallback>
-  </mc:AlternateContent>
-  <p:timing>
-    <p:tnLst>
-      <p:par>
-        <p:cTn id="1" dur="indefinite" restart="never" nodeType="tmRoot">
-          <p:childTnLst>
-            <p:seq concurrent="1" nextAc="seek">
-              <p:cTn id="2" dur="indefinite" nodeType="mainSeq">
-                <p:childTnLst>
-                  <p:par>
-                    <p:cTn id="3" fill="hold">
-                      <p:stCondLst>
-                        <p:cond delay="indefinite"/>
-                      </p:stCondLst>
-                      <p:childTnLst>
-                        <p:par>
-                          <p:cTn id="4" fill="hold">
-                            <p:stCondLst>
-                              <p:cond delay="0"/>
-                            </p:stCondLst>
-                            <p:childTnLst>
-                              <p:par>
-                                <p:cTn id="5" presetID="10" presetClass="entr" presetSubtype="0" fill="hold" grpId="0" nodeType="clickEffect">
-                                  <p:stCondLst>
-                                    <p:cond delay="0"/>
-                                  </p:stCondLst>
-                                  <p:childTnLst>
-                                    <p:set>
-                                      <p:cBhvr>
-                                        <p:cTn id="6" dur="1" fill="hold">
-                                          <p:stCondLst>
-                                            <p:cond delay="0"/>
-                                          </p:stCondLst>
-                                        </p:cTn>
-                                        <p:tgtEl>
-                                          <p:spTgt spid="23"/>
-                                        </p:tgtEl>
-                                        <p:attrNameLst>
-                                          <p:attrName>style.visibility</p:attrName>
-                                        </p:attrNameLst>
-                                      </p:cBhvr>
-                                      <p:to>
-                                        <p:strVal val="visible"/>
-                                      </p:to>
-                                    </p:set>
-                                    <p:animEffect transition="in" filter="fade">
-                                      <p:cBhvr>
-                                        <p:cTn id="7" dur="500"/>
-                                        <p:tgtEl>
-                                          <p:spTgt spid="23"/>
-                                        </p:tgtEl>
-                                      </p:cBhvr>
-                                    </p:animEffect>
-                                  </p:childTnLst>
-                                </p:cTn>
-                              </p:par>
-                            </p:childTnLst>
-                          </p:cTn>
-                        </p:par>
-                      </p:childTnLst>
-                    </p:cTn>
-                  </p:par>
-                  <p:par>
-                    <p:cTn id="8" fill="hold">
-                      <p:stCondLst>
-                        <p:cond delay="indefinite"/>
-                      </p:stCondLst>
-                      <p:childTnLst>
-                        <p:par>
-                          <p:cTn id="9" fill="hold">
-                            <p:stCondLst>
-                              <p:cond delay="0"/>
-                            </p:stCondLst>
-                            <p:childTnLst>
-                              <p:par>
-                                <p:cTn id="10" presetID="10" presetClass="entr" presetSubtype="0" fill="hold" nodeType="clickEffect">
-                                  <p:stCondLst>
-                                    <p:cond delay="0"/>
-                                  </p:stCondLst>
-                                  <p:childTnLst>
-                                    <p:set>
-                                      <p:cBhvr>
-                                        <p:cTn id="11" dur="1" fill="hold">
-                                          <p:stCondLst>
-                                            <p:cond delay="0"/>
-                                          </p:stCondLst>
-                                        </p:cTn>
-                                        <p:tgtEl>
-                                          <p:spTgt spid="49"/>
-                                        </p:tgtEl>
-                                        <p:attrNameLst>
-                                          <p:attrName>style.visibility</p:attrName>
-                                        </p:attrNameLst>
-                                      </p:cBhvr>
-                                      <p:to>
-                                        <p:strVal val="visible"/>
-                                      </p:to>
-                                    </p:set>
-                                    <p:animEffect transition="in" filter="fade">
-                                      <p:cBhvr>
-                                        <p:cTn id="12" dur="500"/>
-                                        <p:tgtEl>
-                                          <p:spTgt spid="49"/>
-                                        </p:tgtEl>
-                                      </p:cBhvr>
-                                    </p:animEffect>
-                                  </p:childTnLst>
-                                </p:cTn>
-                              </p:par>
-                            </p:childTnLst>
-                          </p:cTn>
-                        </p:par>
-                      </p:childTnLst>
-                    </p:cTn>
-                  </p:par>
-                  <p:par>
-                    <p:cTn id="13" fill="hold">
-                      <p:stCondLst>
-                        <p:cond delay="indefinite"/>
-                      </p:stCondLst>
-                      <p:childTnLst>
-                        <p:par>
-                          <p:cTn id="14" fill="hold">
-                            <p:stCondLst>
-                              <p:cond delay="0"/>
-                            </p:stCondLst>
-                            <p:childTnLst>
-                              <p:par>
-                                <p:cTn id="15" presetID="10" presetClass="entr" presetSubtype="0" fill="hold" grpId="0" nodeType="clickEffect">
-                                  <p:stCondLst>
-                                    <p:cond delay="0"/>
-                                  </p:stCondLst>
-                                  <p:childTnLst>
-                                    <p:set>
-                                      <p:cBhvr>
-                                        <p:cTn id="16" dur="1" fill="hold">
-                                          <p:stCondLst>
-                                            <p:cond delay="0"/>
-                                          </p:stCondLst>
-                                        </p:cTn>
-                                        <p:tgtEl>
-                                          <p:spTgt spid="26"/>
-                                        </p:tgtEl>
-                                        <p:attrNameLst>
-                                          <p:attrName>style.visibility</p:attrName>
-                                        </p:attrNameLst>
-                                      </p:cBhvr>
-                                      <p:to>
-                                        <p:strVal val="visible"/>
-                                      </p:to>
-                                    </p:set>
-                                    <p:animEffect transition="in" filter="fade">
-                                      <p:cBhvr>
-                                        <p:cTn id="17" dur="500"/>
-                                        <p:tgtEl>
-                                          <p:spTgt spid="26"/>
-                                        </p:tgtEl>
-                                      </p:cBhvr>
-                                    </p:animEffect>
-                                  </p:childTnLst>
-                                </p:cTn>
-                              </p:par>
-                            </p:childTnLst>
-                          </p:cTn>
-                        </p:par>
-                        <p:par>
-                          <p:cTn id="18" fill="hold">
-                            <p:stCondLst>
-                              <p:cond delay="500"/>
-                            </p:stCondLst>
-                            <p:childTnLst>
-                              <p:par>
-                                <p:cTn id="19" presetID="22" presetClass="entr" presetSubtype="8" fill="hold" nodeType="afterEffect">
-                                  <p:stCondLst>
-                                    <p:cond delay="0"/>
-                                  </p:stCondLst>
-                                  <p:childTnLst>
-                                    <p:set>
-                                      <p:cBhvr>
-                                        <p:cTn id="20" dur="1" fill="hold">
-                                          <p:stCondLst>
-                                            <p:cond delay="0"/>
-                                          </p:stCondLst>
-                                        </p:cTn>
-                                        <p:tgtEl>
-                                          <p:spTgt spid="31"/>
-                                        </p:tgtEl>
-                                        <p:attrNameLst>
-                                          <p:attrName>style.visibility</p:attrName>
-                                        </p:attrNameLst>
-                                      </p:cBhvr>
-                                      <p:to>
-                                        <p:strVal val="visible"/>
-                                      </p:to>
-                                    </p:set>
-                                    <p:animEffect transition="in" filter="wipe(left)">
-                                      <p:cBhvr>
-                                        <p:cTn id="21" dur="500"/>
-                                        <p:tgtEl>
-                                          <p:spTgt spid="31"/>
-                                        </p:tgtEl>
-                                      </p:cBhvr>
-                                    </p:animEffect>
-                                  </p:childTnLst>
-                                </p:cTn>
-                              </p:par>
-                            </p:childTnLst>
-                          </p:cTn>
-                        </p:par>
-                      </p:childTnLst>
-                    </p:cTn>
-                  </p:par>
-                  <p:par>
-                    <p:cTn id="22" fill="hold">
-                      <p:stCondLst>
-                        <p:cond delay="indefinite"/>
-                      </p:stCondLst>
-                      <p:childTnLst>
-                        <p:par>
-                          <p:cTn id="23" fill="hold">
-                            <p:stCondLst>
-                              <p:cond delay="0"/>
-                            </p:stCondLst>
-                            <p:childTnLst>
-                              <p:par>
-                                <p:cTn id="24" presetID="10" presetClass="entr" presetSubtype="0" fill="hold" grpId="0" nodeType="clickEffect">
-                                  <p:stCondLst>
-                                    <p:cond delay="0"/>
-                                  </p:stCondLst>
-                                  <p:childTnLst>
-                                    <p:set>
-                                      <p:cBhvr>
-                                        <p:cTn id="25" dur="1" fill="hold">
-                                          <p:stCondLst>
-                                            <p:cond delay="0"/>
-                                          </p:stCondLst>
-                                        </p:cTn>
-                                        <p:tgtEl>
-                                          <p:spTgt spid="27"/>
-                                        </p:tgtEl>
-                                        <p:attrNameLst>
-                                          <p:attrName>style.visibility</p:attrName>
-                                        </p:attrNameLst>
-                                      </p:cBhvr>
-                                      <p:to>
-                                        <p:strVal val="visible"/>
-                                      </p:to>
-                                    </p:set>
-                                    <p:animEffect transition="in" filter="fade">
-                                      <p:cBhvr>
-                                        <p:cTn id="26" dur="500"/>
-                                        <p:tgtEl>
-                                          <p:spTgt spid="27"/>
-                                        </p:tgtEl>
-                                      </p:cBhvr>
-                                    </p:animEffect>
-                                  </p:childTnLst>
-                                </p:cTn>
-                              </p:par>
-                            </p:childTnLst>
-                          </p:cTn>
-                        </p:par>
-                        <p:par>
-                          <p:cTn id="27" fill="hold">
-                            <p:stCondLst>
-                              <p:cond delay="500"/>
-                            </p:stCondLst>
-                            <p:childTnLst>
-                              <p:par>
-                                <p:cTn id="28" presetID="22" presetClass="entr" presetSubtype="8" fill="hold" nodeType="afterEffect">
-                                  <p:stCondLst>
-                                    <p:cond delay="0"/>
-                                  </p:stCondLst>
-                                  <p:childTnLst>
-                                    <p:set>
-                                      <p:cBhvr>
-                                        <p:cTn id="29" dur="1" fill="hold">
-                                          <p:stCondLst>
-                                            <p:cond delay="0"/>
-                                          </p:stCondLst>
-                                        </p:cTn>
-                                        <p:tgtEl>
-                                          <p:spTgt spid="36"/>
-                                        </p:tgtEl>
-                                        <p:attrNameLst>
-                                          <p:attrName>style.visibility</p:attrName>
-                                        </p:attrNameLst>
-                                      </p:cBhvr>
-                                      <p:to>
-                                        <p:strVal val="visible"/>
-                                      </p:to>
-                                    </p:set>
-                                    <p:animEffect transition="in" filter="wipe(left)">
-                                      <p:cBhvr>
-                                        <p:cTn id="30" dur="500"/>
-                                        <p:tgtEl>
-                                          <p:spTgt spid="36"/>
-                                        </p:tgtEl>
-                                      </p:cBhvr>
-                                    </p:animEffect>
-                                  </p:childTnLst>
-                                </p:cTn>
-                              </p:par>
-                            </p:childTnLst>
-                          </p:cTn>
-                        </p:par>
-                      </p:childTnLst>
-                    </p:cTn>
-                  </p:par>
-                  <p:par>
-                    <p:cTn id="31" fill="hold">
-                      <p:stCondLst>
-                        <p:cond delay="indefinite"/>
-                      </p:stCondLst>
-                      <p:childTnLst>
-                        <p:par>
-                          <p:cTn id="32" fill="hold">
-                            <p:stCondLst>
-                              <p:cond delay="0"/>
-                            </p:stCondLst>
-                            <p:childTnLst>
-                              <p:par>
-                                <p:cTn id="33" presetID="10" presetClass="entr" presetSubtype="0" fill="hold" grpId="0" nodeType="clickEffect">
-                                  <p:stCondLst>
-                                    <p:cond delay="0"/>
-                                  </p:stCondLst>
-                                  <p:childTnLst>
-                                    <p:set>
-                                      <p:cBhvr>
-                                        <p:cTn id="34" dur="1" fill="hold">
-                                          <p:stCondLst>
-                                            <p:cond delay="0"/>
-                                          </p:stCondLst>
-                                        </p:cTn>
-                                        <p:tgtEl>
-                                          <p:spTgt spid="29"/>
-                                        </p:tgtEl>
-                                        <p:attrNameLst>
-                                          <p:attrName>style.visibility</p:attrName>
-                                        </p:attrNameLst>
-                                      </p:cBhvr>
-                                      <p:to>
-                                        <p:strVal val="visible"/>
-                                      </p:to>
-                                    </p:set>
-                                    <p:animEffect transition="in" filter="fade">
-                                      <p:cBhvr>
-                                        <p:cTn id="35" dur="500"/>
-                                        <p:tgtEl>
-                                          <p:spTgt spid="29"/>
-                                        </p:tgtEl>
-                                      </p:cBhvr>
-                                    </p:animEffect>
-                                  </p:childTnLst>
-                                </p:cTn>
-                              </p:par>
-                            </p:childTnLst>
-                          </p:cTn>
-                        </p:par>
-                        <p:par>
-                          <p:cTn id="36" fill="hold">
-                            <p:stCondLst>
-                              <p:cond delay="500"/>
-                            </p:stCondLst>
-                            <p:childTnLst>
-                              <p:par>
-                                <p:cTn id="37" presetID="22" presetClass="entr" presetSubtype="1" fill="hold" nodeType="afterEffect">
-                                  <p:stCondLst>
-                                    <p:cond delay="0"/>
-                                  </p:stCondLst>
-                                  <p:childTnLst>
-                                    <p:set>
-                                      <p:cBhvr>
-                                        <p:cTn id="38" dur="1" fill="hold">
-                                          <p:stCondLst>
-                                            <p:cond delay="0"/>
-                                          </p:stCondLst>
-                                        </p:cTn>
-                                        <p:tgtEl>
-                                          <p:spTgt spid="46"/>
-                                        </p:tgtEl>
-                                        <p:attrNameLst>
-                                          <p:attrName>style.visibility</p:attrName>
-                                        </p:attrNameLst>
-                                      </p:cBhvr>
-                                      <p:to>
-                                        <p:strVal val="visible"/>
-                                      </p:to>
-                                    </p:set>
-                                    <p:animEffect transition="in" filter="wipe(up)">
-                                      <p:cBhvr>
-                                        <p:cTn id="39" dur="500"/>
-                                        <p:tgtEl>
-                                          <p:spTgt spid="46"/>
-                                        </p:tgtEl>
-                                      </p:cBhvr>
-                                    </p:animEffect>
-                                  </p:childTnLst>
-                                </p:cTn>
-                              </p:par>
-                              <p:par>
-                                <p:cTn id="40" presetID="22" presetClass="entr" presetSubtype="8" fill="hold" nodeType="withEffect">
-                                  <p:stCondLst>
-                                    <p:cond delay="0"/>
-                                  </p:stCondLst>
-                                  <p:childTnLst>
-                                    <p:set>
-                                      <p:cBhvr>
-                                        <p:cTn id="41" dur="1" fill="hold">
-                                          <p:stCondLst>
-                                            <p:cond delay="0"/>
-                                          </p:stCondLst>
-                                        </p:cTn>
-                                        <p:tgtEl>
-                                          <p:spTgt spid="38"/>
-                                        </p:tgtEl>
-                                        <p:attrNameLst>
-                                          <p:attrName>style.visibility</p:attrName>
-                                        </p:attrNameLst>
-                                      </p:cBhvr>
-                                      <p:to>
-                                        <p:strVal val="visible"/>
-                                      </p:to>
-                                    </p:set>
-                                    <p:animEffect transition="in" filter="wipe(left)">
-                                      <p:cBhvr>
-                                        <p:cTn id="42" dur="500"/>
-                                        <p:tgtEl>
-                                          <p:spTgt spid="38"/>
-                                        </p:tgtEl>
-                                      </p:cBhvr>
-                                    </p:animEffect>
-                                  </p:childTnLst>
-                                </p:cTn>
-                              </p:par>
-                            </p:childTnLst>
-                          </p:cTn>
-                        </p:par>
-                      </p:childTnLst>
-                    </p:cTn>
-                  </p:par>
-                  <p:par>
-                    <p:cTn id="43" fill="hold">
-                      <p:stCondLst>
-                        <p:cond delay="indefinite"/>
-                      </p:stCondLst>
-                      <p:childTnLst>
-                        <p:par>
-                          <p:cTn id="44" fill="hold">
-                            <p:stCondLst>
-                              <p:cond delay="0"/>
-                            </p:stCondLst>
-                            <p:childTnLst>
-                              <p:par>
-                                <p:cTn id="45" presetID="22" presetClass="entr" presetSubtype="2" fill="hold" nodeType="clickEffect">
-                                  <p:stCondLst>
-                                    <p:cond delay="0"/>
-                                  </p:stCondLst>
-                                  <p:childTnLst>
-                                    <p:set>
-                                      <p:cBhvr>
-                                        <p:cTn id="46" dur="1" fill="hold">
-                                          <p:stCondLst>
-                                            <p:cond delay="0"/>
-                                          </p:stCondLst>
-                                        </p:cTn>
-                                        <p:tgtEl>
-                                          <p:spTgt spid="4"/>
-                                        </p:tgtEl>
-                                        <p:attrNameLst>
-                                          <p:attrName>style.visibility</p:attrName>
-                                        </p:attrNameLst>
-                                      </p:cBhvr>
-                                      <p:to>
-                                        <p:strVal val="visible"/>
-                                      </p:to>
-                                    </p:set>
-                                    <p:animEffect transition="in" filter="wipe(right)">
-                                      <p:cBhvr>
-                                        <p:cTn id="47" dur="500"/>
-                                        <p:tgtEl>
-                                          <p:spTgt spid="4"/>
-                                        </p:tgtEl>
-                                      </p:cBhvr>
-                                    </p:animEffect>
-                                  </p:childTnLst>
-                                </p:cTn>
-                              </p:par>
-                            </p:childTnLst>
-                          </p:cTn>
-                        </p:par>
-                      </p:childTnLst>
-                    </p:cTn>
-                  </p:par>
-                </p:childTnLst>
-              </p:cTn>
-              <p:prevCondLst>
-                <p:cond evt="onPrev" delay="0">
-                  <p:tgtEl>
-                    <p:sldTgt/>
-                  </p:tgtEl>
-                </p:cond>
-              </p:prevCondLst>
-              <p:nextCondLst>
-                <p:cond evt="onNext" delay="0">
-                  <p:tgtEl>
-                    <p:sldTgt/>
-                  </p:tgtEl>
-                </p:cond>
-              </p:nextCondLst>
-            </p:seq>
-          </p:childTnLst>
-        </p:cTn>
-      </p:par>
-    </p:tnLst>
-    <p:bldLst>
-      <p:bldP spid="23" grpId="0" animBg="1"/>
-      <p:bldP spid="26" grpId="0" animBg="1"/>
-      <p:bldP spid="27" grpId="0" animBg="1"/>
-      <p:bldP spid="29" grpId="0" animBg="1"/>
-    </p:bldLst>
-  </p:timing>
-</p:sld>
-</file>
-
-<file path=ppt/slides/slide27.xml><?xml version="1.0" encoding="utf-8"?>
-<p:sld xmlns:a="http://schemas.openxmlformats.org/drawingml/2006/main" xmlns:r="http://schemas.openxmlformats.org/officeDocument/2006/relationships" xmlns:p="http://schemas.openxmlformats.org/presentationml/2006/main">
-  <p:cSld>
-    <p:spTree>
-      <p:nvGrpSpPr>
-        <p:cNvPr id="1" name=""/>
-        <p:cNvGrpSpPr/>
-        <p:nvPr/>
-      </p:nvGrpSpPr>
-      <p:grpSpPr>
-        <a:xfrm>
-          <a:off x="0" y="0"/>
-          <a:ext cx="0" cy="0"/>
-          <a:chOff x="0" y="0"/>
-          <a:chExt cx="0" cy="0"/>
-        </a:xfrm>
-      </p:grpSpPr>
-      <p:sp>
-        <p:nvSpPr>
-          <p:cNvPr id="3" name="Title 2"/>
-          <p:cNvSpPr>
-            <a:spLocks noGrp="1"/>
-          </p:cNvSpPr>
-          <p:nvPr>
-            <p:ph type="title"/>
-          </p:nvPr>
-        </p:nvSpPr>
-        <p:spPr>
-          <a:xfrm>
-            <a:off x="274638" y="1209973"/>
-            <a:ext cx="9144000" cy="1735860"/>
-          </a:xfrm>
-        </p:spPr>
-        <p:txBody>
-          <a:bodyPr/>
-          <a:lstStyle/>
-          <a:p>
-            <a:r>
-              <a:rPr lang="en-US" dirty="0"/>
-              <a:t>Demo</a:t>
-            </a:r>
-            <a:br>
-              <a:rPr lang="en-US" dirty="0"/>
-            </a:br>
-            <a:r>
-              <a:rPr lang="en-US" sz="4000" dirty="0"/>
               <a:t>Same model, multiple platforms</a:t>
             </a:r>
           </a:p>
@@ -14433,7 +11351,7 @@
 </p:sld>
 </file>
 
-<file path=ppt/slides/slide28.xml><?xml version="1.0" encoding="utf-8"?>
+<file path=ppt/slides/slide25.xml><?xml version="1.0" encoding="utf-8"?>
 <p:sld xmlns:a="http://schemas.openxmlformats.org/drawingml/2006/main" xmlns:r="http://schemas.openxmlformats.org/officeDocument/2006/relationships" xmlns:p="http://schemas.openxmlformats.org/presentationml/2006/main">
   <p:cSld>
     <p:spTree>
@@ -14539,7 +11457,7 @@
 </p:sld>
 </file>
 
-<file path=ppt/slides/slide29.xml><?xml version="1.0" encoding="utf-8"?>
+<file path=ppt/slides/slide26.xml><?xml version="1.0" encoding="utf-8"?>
 <p:sld xmlns:a="http://schemas.openxmlformats.org/drawingml/2006/main" xmlns:r="http://schemas.openxmlformats.org/officeDocument/2006/relationships" xmlns:p="http://schemas.openxmlformats.org/presentationml/2006/main">
   <p:cSld>
     <p:spTree>
@@ -14640,6 +11558,328 @@
 </p:sld>
 </file>
 
+<file path=ppt/slides/slide27.xml><?xml version="1.0" encoding="utf-8"?>
+<p:sld xmlns:a="http://schemas.openxmlformats.org/drawingml/2006/main" xmlns:r="http://schemas.openxmlformats.org/officeDocument/2006/relationships" xmlns:p="http://schemas.openxmlformats.org/presentationml/2006/main">
+  <p:cSld>
+    <p:spTree>
+      <p:nvGrpSpPr>
+        <p:cNvPr id="1" name=""/>
+        <p:cNvGrpSpPr/>
+        <p:nvPr/>
+      </p:nvGrpSpPr>
+      <p:grpSpPr>
+        <a:xfrm>
+          <a:off x="0" y="0"/>
+          <a:ext cx="0" cy="0"/>
+          <a:chOff x="0" y="0"/>
+          <a:chExt cx="0" cy="0"/>
+        </a:xfrm>
+      </p:grpSpPr>
+      <p:sp>
+        <p:nvSpPr>
+          <p:cNvPr id="2" name="Title 1"/>
+          <p:cNvSpPr>
+            <a:spLocks noGrp="1"/>
+          </p:cNvSpPr>
+          <p:nvPr>
+            <p:ph type="title"/>
+          </p:nvPr>
+        </p:nvSpPr>
+        <p:spPr/>
+        <p:txBody>
+          <a:bodyPr/>
+          <a:lstStyle/>
+          <a:p>
+            <a:r>
+              <a:rPr lang="en-US" dirty="0"/>
+              <a:t>Next steps</a:t>
+            </a:r>
+          </a:p>
+        </p:txBody>
+      </p:sp>
+    </p:spTree>
+    <p:extLst>
+      <p:ext uri="{BB962C8B-B14F-4D97-AF65-F5344CB8AC3E}">
+        <p14:creationId xmlns:p14="http://schemas.microsoft.com/office/powerpoint/2010/main" val="1001012245"/>
+      </p:ext>
+    </p:extLst>
+  </p:cSld>
+  <p:clrMapOvr>
+    <a:masterClrMapping/>
+  </p:clrMapOvr>
+  <p:transition>
+    <p:fade/>
+  </p:transition>
+</p:sld>
+</file>
+
+<file path=ppt/slides/slide28.xml><?xml version="1.0" encoding="utf-8"?>
+<p:sld xmlns:a="http://schemas.openxmlformats.org/drawingml/2006/main" xmlns:r="http://schemas.openxmlformats.org/officeDocument/2006/relationships" xmlns:p="http://schemas.openxmlformats.org/presentationml/2006/main">
+  <p:cSld>
+    <p:spTree>
+      <p:nvGrpSpPr>
+        <p:cNvPr id="1" name=""/>
+        <p:cNvGrpSpPr/>
+        <p:nvPr/>
+      </p:nvGrpSpPr>
+      <p:grpSpPr>
+        <a:xfrm>
+          <a:off x="0" y="0"/>
+          <a:ext cx="0" cy="0"/>
+          <a:chOff x="0" y="0"/>
+          <a:chExt cx="0" cy="0"/>
+        </a:xfrm>
+      </p:grpSpPr>
+      <p:sp>
+        <p:nvSpPr>
+          <p:cNvPr id="2" name="Title 1"/>
+          <p:cNvSpPr>
+            <a:spLocks noGrp="1"/>
+          </p:cNvSpPr>
+          <p:nvPr>
+            <p:ph type="title"/>
+          </p:nvPr>
+        </p:nvSpPr>
+        <p:spPr/>
+        <p:txBody>
+          <a:bodyPr/>
+          <a:lstStyle/>
+          <a:p>
+            <a:r>
+              <a:rPr lang="en-US" dirty="0"/>
+              <a:t>Next steps</a:t>
+            </a:r>
+          </a:p>
+        </p:txBody>
+      </p:sp>
+      <p:sp>
+        <p:nvSpPr>
+          <p:cNvPr id="3" name="Text Placeholder 2"/>
+          <p:cNvSpPr>
+            <a:spLocks noGrp="1"/>
+          </p:cNvSpPr>
+          <p:nvPr>
+            <p:ph type="body" sz="quarter" idx="10"/>
+          </p:nvPr>
+        </p:nvSpPr>
+        <p:spPr>
+          <a:xfrm>
+            <a:off x="274638" y="1212850"/>
+            <a:ext cx="11887200" cy="2092881"/>
+          </a:xfrm>
+        </p:spPr>
+        <p:txBody>
+          <a:bodyPr/>
+          <a:lstStyle/>
+          <a:p>
+            <a:pPr lvl="0">
+              <a:buClr>
+                <a:srgbClr val="FFFFFF"/>
+              </a:buClr>
+            </a:pPr>
+            <a:r>
+              <a:rPr lang="en-US" dirty="0">
+                <a:gradFill>
+                  <a:gsLst>
+                    <a:gs pos="1250">
+                      <a:schemeClr val="tx2"/>
+                    </a:gs>
+                    <a:gs pos="99000">
+                      <a:schemeClr val="tx2"/>
+                    </a:gs>
+                  </a:gsLst>
+                  <a:lin ang="5400000" scaled="0"/>
+                </a:gradFill>
+              </a:rPr>
+              <a:t>docs.efproject.net</a:t>
+            </a:r>
+          </a:p>
+          <a:p>
+            <a:pPr lvl="0">
+              <a:buClr>
+                <a:srgbClr val="FFFFFF"/>
+              </a:buClr>
+            </a:pPr>
+            <a:r>
+              <a:rPr lang="en-US" dirty="0">
+                <a:gradFill>
+                  <a:gsLst>
+                    <a:gs pos="1250">
+                      <a:schemeClr val="tx2"/>
+                    </a:gs>
+                    <a:gs pos="99000">
+                      <a:schemeClr val="tx2"/>
+                    </a:gs>
+                  </a:gsLst>
+                  <a:lin ang="5400000" scaled="0"/>
+                </a:gradFill>
+              </a:rPr>
+              <a:t>github.com/</a:t>
+            </a:r>
+            <a:r>
+              <a:rPr lang="en-US" dirty="0" err="1">
+                <a:gradFill>
+                  <a:gsLst>
+                    <a:gs pos="1250">
+                      <a:schemeClr val="tx2"/>
+                    </a:gs>
+                    <a:gs pos="99000">
+                      <a:schemeClr val="tx2"/>
+                    </a:gs>
+                  </a:gsLst>
+                  <a:lin ang="5400000" scaled="0"/>
+                </a:gradFill>
+              </a:rPr>
+              <a:t>aspnet</a:t>
+            </a:r>
+            <a:r>
+              <a:rPr lang="en-US" dirty="0">
+                <a:gradFill>
+                  <a:gsLst>
+                    <a:gs pos="1250">
+                      <a:schemeClr val="tx2"/>
+                    </a:gs>
+                    <a:gs pos="99000">
+                      <a:schemeClr val="tx2"/>
+                    </a:gs>
+                  </a:gsLst>
+                  <a:lin ang="5400000" scaled="0"/>
+                </a:gradFill>
+              </a:rPr>
+              <a:t>/</a:t>
+            </a:r>
+            <a:r>
+              <a:rPr lang="en-US" dirty="0" err="1">
+                <a:gradFill>
+                  <a:gsLst>
+                    <a:gs pos="1250">
+                      <a:schemeClr val="tx2"/>
+                    </a:gs>
+                    <a:gs pos="99000">
+                      <a:schemeClr val="tx2"/>
+                    </a:gs>
+                  </a:gsLst>
+                  <a:lin ang="5400000" scaled="0"/>
+                </a:gradFill>
+              </a:rPr>
+              <a:t>EntityFramework</a:t>
+            </a:r>
+            <a:endParaRPr lang="en-US" dirty="0">
+              <a:gradFill>
+                <a:gsLst>
+                  <a:gs pos="1250">
+                    <a:schemeClr val="tx2"/>
+                  </a:gs>
+                  <a:gs pos="99000">
+                    <a:schemeClr val="tx2"/>
+                  </a:gs>
+                </a:gsLst>
+                <a:lin ang="5400000" scaled="0"/>
+              </a:gradFill>
+            </a:endParaRPr>
+          </a:p>
+          <a:p>
+            <a:pPr lvl="0">
+              <a:buClr>
+                <a:srgbClr val="FFFFFF"/>
+              </a:buClr>
+            </a:pPr>
+            <a:r>
+              <a:rPr lang="en-US" dirty="0">
+                <a:gradFill>
+                  <a:gsLst>
+                    <a:gs pos="1250">
+                      <a:schemeClr val="tx2"/>
+                    </a:gs>
+                    <a:gs pos="99000">
+                      <a:schemeClr val="tx2"/>
+                    </a:gs>
+                  </a:gsLst>
+                  <a:lin ang="5400000" scaled="0"/>
+                </a:gradFill>
+              </a:rPr>
+              <a:t>github.com/</a:t>
+            </a:r>
+            <a:r>
+              <a:rPr lang="en-US" dirty="0" err="1">
+                <a:gradFill>
+                  <a:gsLst>
+                    <a:gs pos="1250">
+                      <a:schemeClr val="tx2"/>
+                    </a:gs>
+                    <a:gs pos="99000">
+                      <a:schemeClr val="tx2"/>
+                    </a:gs>
+                  </a:gsLst>
+                  <a:lin ang="5400000" scaled="0"/>
+                </a:gradFill>
+              </a:rPr>
+              <a:t>rowanmiller</a:t>
+            </a:r>
+            <a:r>
+              <a:rPr lang="en-US" dirty="0">
+                <a:gradFill>
+                  <a:gsLst>
+                    <a:gs pos="1250">
+                      <a:schemeClr val="tx2"/>
+                    </a:gs>
+                    <a:gs pos="99000">
+                      <a:schemeClr val="tx2"/>
+                    </a:gs>
+                  </a:gsLst>
+                  <a:lin ang="5400000" scaled="0"/>
+                </a:gradFill>
+              </a:rPr>
+              <a:t>/Demo-</a:t>
+            </a:r>
+            <a:r>
+              <a:rPr lang="en-US" dirty="0" err="1">
+                <a:gradFill>
+                  <a:gsLst>
+                    <a:gs pos="1250">
+                      <a:schemeClr val="tx2"/>
+                    </a:gs>
+                    <a:gs pos="99000">
+                      <a:schemeClr val="tx2"/>
+                    </a:gs>
+                  </a:gsLst>
+                  <a:lin ang="5400000" scaled="0"/>
+                </a:gradFill>
+              </a:rPr>
+              <a:t>EFCore</a:t>
+            </a:r>
+            <a:endParaRPr lang="en-US" dirty="0">
+              <a:gradFill>
+                <a:gsLst>
+                  <a:gs pos="1250">
+                    <a:schemeClr val="tx2"/>
+                  </a:gs>
+                  <a:gs pos="99000">
+                    <a:schemeClr val="tx2"/>
+                  </a:gs>
+                </a:gsLst>
+                <a:lin ang="5400000" scaled="0"/>
+              </a:gradFill>
+            </a:endParaRPr>
+          </a:p>
+        </p:txBody>
+      </p:sp>
+    </p:spTree>
+    <p:extLst>
+      <p:ext uri="{BB962C8B-B14F-4D97-AF65-F5344CB8AC3E}">
+        <p14:creationId xmlns:p14="http://schemas.microsoft.com/office/powerpoint/2010/main" val="967192771"/>
+      </p:ext>
+    </p:extLst>
+  </p:cSld>
+  <p:clrMapOvr>
+    <a:masterClrMapping/>
+  </p:clrMapOvr>
+  <p:transition>
+    <p:fade/>
+  </p:transition>
+</p:sld>
+</file>
+
 <file path=ppt/slides/slide3.xml><?xml version="1.0" encoding="utf-8"?>
 <p:sld xmlns:a="http://schemas.openxmlformats.org/drawingml/2006/main" xmlns:r="http://schemas.openxmlformats.org/officeDocument/2006/relationships" xmlns:p="http://schemas.openxmlformats.org/presentationml/2006/main">
   <p:cSld>
@@ -14740,328 +11980,6 @@
     <p:extLst>
       <p:ext uri="{BB962C8B-B14F-4D97-AF65-F5344CB8AC3E}">
         <p14:creationId xmlns:p14="http://schemas.microsoft.com/office/powerpoint/2010/main" val="2644953676"/>
-      </p:ext>
-    </p:extLst>
-  </p:cSld>
-  <p:clrMapOvr>
-    <a:masterClrMapping/>
-  </p:clrMapOvr>
-  <p:transition>
-    <p:fade/>
-  </p:transition>
-</p:sld>
-</file>
-
-<file path=ppt/slides/slide30.xml><?xml version="1.0" encoding="utf-8"?>
-<p:sld xmlns:a="http://schemas.openxmlformats.org/drawingml/2006/main" xmlns:r="http://schemas.openxmlformats.org/officeDocument/2006/relationships" xmlns:p="http://schemas.openxmlformats.org/presentationml/2006/main">
-  <p:cSld>
-    <p:spTree>
-      <p:nvGrpSpPr>
-        <p:cNvPr id="1" name=""/>
-        <p:cNvGrpSpPr/>
-        <p:nvPr/>
-      </p:nvGrpSpPr>
-      <p:grpSpPr>
-        <a:xfrm>
-          <a:off x="0" y="0"/>
-          <a:ext cx="0" cy="0"/>
-          <a:chOff x="0" y="0"/>
-          <a:chExt cx="0" cy="0"/>
-        </a:xfrm>
-      </p:grpSpPr>
-      <p:sp>
-        <p:nvSpPr>
-          <p:cNvPr id="2" name="Title 1"/>
-          <p:cNvSpPr>
-            <a:spLocks noGrp="1"/>
-          </p:cNvSpPr>
-          <p:nvPr>
-            <p:ph type="title"/>
-          </p:nvPr>
-        </p:nvSpPr>
-        <p:spPr/>
-        <p:txBody>
-          <a:bodyPr/>
-          <a:lstStyle/>
-          <a:p>
-            <a:r>
-              <a:rPr lang="en-US" dirty="0"/>
-              <a:t>Next steps</a:t>
-            </a:r>
-          </a:p>
-        </p:txBody>
-      </p:sp>
-    </p:spTree>
-    <p:extLst>
-      <p:ext uri="{BB962C8B-B14F-4D97-AF65-F5344CB8AC3E}">
-        <p14:creationId xmlns:p14="http://schemas.microsoft.com/office/powerpoint/2010/main" val="1001012245"/>
-      </p:ext>
-    </p:extLst>
-  </p:cSld>
-  <p:clrMapOvr>
-    <a:masterClrMapping/>
-  </p:clrMapOvr>
-  <p:transition>
-    <p:fade/>
-  </p:transition>
-</p:sld>
-</file>
-
-<file path=ppt/slides/slide31.xml><?xml version="1.0" encoding="utf-8"?>
-<p:sld xmlns:a="http://schemas.openxmlformats.org/drawingml/2006/main" xmlns:r="http://schemas.openxmlformats.org/officeDocument/2006/relationships" xmlns:p="http://schemas.openxmlformats.org/presentationml/2006/main">
-  <p:cSld>
-    <p:spTree>
-      <p:nvGrpSpPr>
-        <p:cNvPr id="1" name=""/>
-        <p:cNvGrpSpPr/>
-        <p:nvPr/>
-      </p:nvGrpSpPr>
-      <p:grpSpPr>
-        <a:xfrm>
-          <a:off x="0" y="0"/>
-          <a:ext cx="0" cy="0"/>
-          <a:chOff x="0" y="0"/>
-          <a:chExt cx="0" cy="0"/>
-        </a:xfrm>
-      </p:grpSpPr>
-      <p:sp>
-        <p:nvSpPr>
-          <p:cNvPr id="2" name="Title 1"/>
-          <p:cNvSpPr>
-            <a:spLocks noGrp="1"/>
-          </p:cNvSpPr>
-          <p:nvPr>
-            <p:ph type="title"/>
-          </p:nvPr>
-        </p:nvSpPr>
-        <p:spPr/>
-        <p:txBody>
-          <a:bodyPr/>
-          <a:lstStyle/>
-          <a:p>
-            <a:r>
-              <a:rPr lang="en-US" dirty="0"/>
-              <a:t>Next steps</a:t>
-            </a:r>
-          </a:p>
-        </p:txBody>
-      </p:sp>
-      <p:sp>
-        <p:nvSpPr>
-          <p:cNvPr id="3" name="Text Placeholder 2"/>
-          <p:cNvSpPr>
-            <a:spLocks noGrp="1"/>
-          </p:cNvSpPr>
-          <p:nvPr>
-            <p:ph type="body" sz="quarter" idx="10"/>
-          </p:nvPr>
-        </p:nvSpPr>
-        <p:spPr>
-          <a:xfrm>
-            <a:off x="274638" y="1212850"/>
-            <a:ext cx="11887200" cy="2092881"/>
-          </a:xfrm>
-        </p:spPr>
-        <p:txBody>
-          <a:bodyPr/>
-          <a:lstStyle/>
-          <a:p>
-            <a:pPr lvl="0">
-              <a:buClr>
-                <a:srgbClr val="FFFFFF"/>
-              </a:buClr>
-            </a:pPr>
-            <a:r>
-              <a:rPr lang="en-US" dirty="0">
-                <a:gradFill>
-                  <a:gsLst>
-                    <a:gs pos="1250">
-                      <a:schemeClr val="tx2"/>
-                    </a:gs>
-                    <a:gs pos="99000">
-                      <a:schemeClr val="tx2"/>
-                    </a:gs>
-                  </a:gsLst>
-                  <a:lin ang="5400000" scaled="0"/>
-                </a:gradFill>
-              </a:rPr>
-              <a:t>docs.efproject.net</a:t>
-            </a:r>
-          </a:p>
-          <a:p>
-            <a:pPr lvl="0">
-              <a:buClr>
-                <a:srgbClr val="FFFFFF"/>
-              </a:buClr>
-            </a:pPr>
-            <a:r>
-              <a:rPr lang="en-US" dirty="0">
-                <a:gradFill>
-                  <a:gsLst>
-                    <a:gs pos="1250">
-                      <a:schemeClr val="tx2"/>
-                    </a:gs>
-                    <a:gs pos="99000">
-                      <a:schemeClr val="tx2"/>
-                    </a:gs>
-                  </a:gsLst>
-                  <a:lin ang="5400000" scaled="0"/>
-                </a:gradFill>
-              </a:rPr>
-              <a:t>github.com/</a:t>
-            </a:r>
-            <a:r>
-              <a:rPr lang="en-US" dirty="0" err="1">
-                <a:gradFill>
-                  <a:gsLst>
-                    <a:gs pos="1250">
-                      <a:schemeClr val="tx2"/>
-                    </a:gs>
-                    <a:gs pos="99000">
-                      <a:schemeClr val="tx2"/>
-                    </a:gs>
-                  </a:gsLst>
-                  <a:lin ang="5400000" scaled="0"/>
-                </a:gradFill>
-              </a:rPr>
-              <a:t>aspnet</a:t>
-            </a:r>
-            <a:r>
-              <a:rPr lang="en-US" dirty="0">
-                <a:gradFill>
-                  <a:gsLst>
-                    <a:gs pos="1250">
-                      <a:schemeClr val="tx2"/>
-                    </a:gs>
-                    <a:gs pos="99000">
-                      <a:schemeClr val="tx2"/>
-                    </a:gs>
-                  </a:gsLst>
-                  <a:lin ang="5400000" scaled="0"/>
-                </a:gradFill>
-              </a:rPr>
-              <a:t>/</a:t>
-            </a:r>
-            <a:r>
-              <a:rPr lang="en-US" dirty="0" err="1">
-                <a:gradFill>
-                  <a:gsLst>
-                    <a:gs pos="1250">
-                      <a:schemeClr val="tx2"/>
-                    </a:gs>
-                    <a:gs pos="99000">
-                      <a:schemeClr val="tx2"/>
-                    </a:gs>
-                  </a:gsLst>
-                  <a:lin ang="5400000" scaled="0"/>
-                </a:gradFill>
-              </a:rPr>
-              <a:t>EntityFramework</a:t>
-            </a:r>
-            <a:endParaRPr lang="en-US" dirty="0">
-              <a:gradFill>
-                <a:gsLst>
-                  <a:gs pos="1250">
-                    <a:schemeClr val="tx2"/>
-                  </a:gs>
-                  <a:gs pos="99000">
-                    <a:schemeClr val="tx2"/>
-                  </a:gs>
-                </a:gsLst>
-                <a:lin ang="5400000" scaled="0"/>
-              </a:gradFill>
-            </a:endParaRPr>
-          </a:p>
-          <a:p>
-            <a:pPr lvl="0">
-              <a:buClr>
-                <a:srgbClr val="FFFFFF"/>
-              </a:buClr>
-            </a:pPr>
-            <a:r>
-              <a:rPr lang="en-US" dirty="0">
-                <a:gradFill>
-                  <a:gsLst>
-                    <a:gs pos="1250">
-                      <a:schemeClr val="tx2"/>
-                    </a:gs>
-                    <a:gs pos="99000">
-                      <a:schemeClr val="tx2"/>
-                    </a:gs>
-                  </a:gsLst>
-                  <a:lin ang="5400000" scaled="0"/>
-                </a:gradFill>
-              </a:rPr>
-              <a:t>github.com/</a:t>
-            </a:r>
-            <a:r>
-              <a:rPr lang="en-US" dirty="0" err="1">
-                <a:gradFill>
-                  <a:gsLst>
-                    <a:gs pos="1250">
-                      <a:schemeClr val="tx2"/>
-                    </a:gs>
-                    <a:gs pos="99000">
-                      <a:schemeClr val="tx2"/>
-                    </a:gs>
-                  </a:gsLst>
-                  <a:lin ang="5400000" scaled="0"/>
-                </a:gradFill>
-              </a:rPr>
-              <a:t>rowanmiller</a:t>
-            </a:r>
-            <a:r>
-              <a:rPr lang="en-US" dirty="0">
-                <a:gradFill>
-                  <a:gsLst>
-                    <a:gs pos="1250">
-                      <a:schemeClr val="tx2"/>
-                    </a:gs>
-                    <a:gs pos="99000">
-                      <a:schemeClr val="tx2"/>
-                    </a:gs>
-                  </a:gsLst>
-                  <a:lin ang="5400000" scaled="0"/>
-                </a:gradFill>
-              </a:rPr>
-              <a:t>/Demo-</a:t>
-            </a:r>
-            <a:r>
-              <a:rPr lang="en-US" dirty="0" err="1">
-                <a:gradFill>
-                  <a:gsLst>
-                    <a:gs pos="1250">
-                      <a:schemeClr val="tx2"/>
-                    </a:gs>
-                    <a:gs pos="99000">
-                      <a:schemeClr val="tx2"/>
-                    </a:gs>
-                  </a:gsLst>
-                  <a:lin ang="5400000" scaled="0"/>
-                </a:gradFill>
-              </a:rPr>
-              <a:t>EFCore</a:t>
-            </a:r>
-            <a:endParaRPr lang="en-US" dirty="0">
-              <a:gradFill>
-                <a:gsLst>
-                  <a:gs pos="1250">
-                    <a:schemeClr val="tx2"/>
-                  </a:gs>
-                  <a:gs pos="99000">
-                    <a:schemeClr val="tx2"/>
-                  </a:gs>
-                </a:gsLst>
-                <a:lin ang="5400000" scaled="0"/>
-              </a:gradFill>
-            </a:endParaRPr>
-          </a:p>
-        </p:txBody>
-      </p:sp>
-    </p:spTree>
-    <p:extLst>
-      <p:ext uri="{BB962C8B-B14F-4D97-AF65-F5344CB8AC3E}">
-        <p14:creationId xmlns:p14="http://schemas.microsoft.com/office/powerpoint/2010/main" val="967192771"/>
       </p:ext>
     </p:extLst>
   </p:cSld>
@@ -21065,25 +17983,12 @@
 </file>
 
 <file path=customXml/item1.xml><?xml version="1.0" encoding="utf-8"?>
-<p:properties xmlns:p="http://schemas.microsoft.com/office/2006/metadata/properties" xmlns:xsi="http://www.w3.org/2001/XMLSchema-instance" xmlns:pc="http://schemas.microsoft.com/office/infopath/2007/PartnerControls">
-  <documentManagement>
-    <_ip_UnifiedCompliancePolicyUIAction xmlns="http://schemas.microsoft.com/sharepoint/v3" xsi:nil="true"/>
-    <_ip_UnifiedCompliancePolicyProperties xmlns="http://schemas.microsoft.com/sharepoint/v3" xsi:nil="true"/>
-    <PublishingExpirationDate xmlns="http://schemas.microsoft.com/sharepoint/v3" xsi:nil="true"/>
-    <PublishingStartDate xmlns="http://schemas.microsoft.com/sharepoint/v3" xsi:nil="true"/>
-    <_ShortcutUrl xmlns="0cd5e047-7587-471a-b27c-5f56c6d0ac56">
-      <Url xsi:nil="true"/>
-      <Description xsi:nil="true"/>
-    </_ShortcutUrl>
-    <SharedWithUsers xmlns="b92fdc2a-1594-4510-aa86-45464713a14f">
-      <UserInfo>
-        <DisplayName>Jon Fancey</DisplayName>
-        <AccountId>16678</AccountId>
-        <AccountType/>
-      </UserInfo>
-    </SharedWithUsers>
-  </documentManagement>
-</p:properties>
+<?mso-contentType ?>
+<FormTemplates xmlns="http://schemas.microsoft.com/sharepoint/v3/contenttype/forms">
+  <Display>DocumentLibraryForm</Display>
+  <Edit>DocumentLibraryForm</Edit>
+  <New>DocumentLibraryForm</New>
+</FormTemplates>
 </file>
 
 <file path=customXml/item2.xml><?xml version="1.0" encoding="utf-8"?>
@@ -21282,28 +18187,31 @@
 </file>
 
 <file path=customXml/item3.xml><?xml version="1.0" encoding="utf-8"?>
-<?mso-contentType ?>
-<FormTemplates xmlns="http://schemas.microsoft.com/sharepoint/v3/contenttype/forms">
-  <Display>DocumentLibraryForm</Display>
-  <Edit>DocumentLibraryForm</Edit>
-  <New>DocumentLibraryForm</New>
-</FormTemplates>
+<p:properties xmlns:p="http://schemas.microsoft.com/office/2006/metadata/properties" xmlns:xsi="http://www.w3.org/2001/XMLSchema-instance" xmlns:pc="http://schemas.microsoft.com/office/infopath/2007/PartnerControls">
+  <documentManagement>
+    <_ip_UnifiedCompliancePolicyUIAction xmlns="http://schemas.microsoft.com/sharepoint/v3" xsi:nil="true"/>
+    <_ip_UnifiedCompliancePolicyProperties xmlns="http://schemas.microsoft.com/sharepoint/v3" xsi:nil="true"/>
+    <PublishingExpirationDate xmlns="http://schemas.microsoft.com/sharepoint/v3" xsi:nil="true"/>
+    <PublishingStartDate xmlns="http://schemas.microsoft.com/sharepoint/v3" xsi:nil="true"/>
+    <_ShortcutUrl xmlns="0cd5e047-7587-471a-b27c-5f56c6d0ac56">
+      <Url xsi:nil="true"/>
+      <Description xsi:nil="true"/>
+    </_ShortcutUrl>
+    <SharedWithUsers xmlns="b92fdc2a-1594-4510-aa86-45464713a14f">
+      <UserInfo>
+        <DisplayName>Jon Fancey</DisplayName>
+        <AccountId>16678</AccountId>
+        <AccountType/>
+      </UserInfo>
+    </SharedWithUsers>
+  </documentManagement>
+</p:properties>
 </file>
 
 <file path=customXml/itemProps1.xml><?xml version="1.0" encoding="utf-8"?>
-<ds:datastoreItem xmlns:ds="http://schemas.openxmlformats.org/officeDocument/2006/customXml" ds:itemID="{F990F116-B58F-4255-B05B-DA3808E0E5C6}">
+<ds:datastoreItem xmlns:ds="http://schemas.openxmlformats.org/officeDocument/2006/customXml" ds:itemID="{758FDAC0-319D-4A54-8D8E-1D42CB1F8004}">
   <ds:schemaRefs>
-    <ds:schemaRef ds:uri="b92fdc2a-1594-4510-aa86-45464713a14f"/>
-    <ds:schemaRef ds:uri="http://purl.org/dc/elements/1.1/"/>
-    <ds:schemaRef ds:uri="http://schemas.microsoft.com/office/2006/metadata/properties"/>
-    <ds:schemaRef ds:uri="http://schemas.microsoft.com/sharepoint/v3"/>
-    <ds:schemaRef ds:uri="0cd5e047-7587-471a-b27c-5f56c6d0ac56"/>
-    <ds:schemaRef ds:uri="http://purl.org/dc/terms/"/>
-    <ds:schemaRef ds:uri="http://schemas.openxmlformats.org/package/2006/metadata/core-properties"/>
-    <ds:schemaRef ds:uri="http://schemas.microsoft.com/office/2006/documentManagement/types"/>
-    <ds:schemaRef ds:uri="http://schemas.microsoft.com/office/infopath/2007/PartnerControls"/>
-    <ds:schemaRef ds:uri="http://www.w3.org/XML/1998/namespace"/>
-    <ds:schemaRef ds:uri="http://purl.org/dc/dcmitype/"/>
+    <ds:schemaRef ds:uri="http://schemas.microsoft.com/sharepoint/v3/contenttype/forms"/>
   </ds:schemaRefs>
 </ds:datastoreItem>
 </file>
@@ -21329,9 +18237,19 @@
 </file>
 
 <file path=customXml/itemProps3.xml><?xml version="1.0" encoding="utf-8"?>
-<ds:datastoreItem xmlns:ds="http://schemas.openxmlformats.org/officeDocument/2006/customXml" ds:itemID="{758FDAC0-319D-4A54-8D8E-1D42CB1F8004}">
+<ds:datastoreItem xmlns:ds="http://schemas.openxmlformats.org/officeDocument/2006/customXml" ds:itemID="{F990F116-B58F-4255-B05B-DA3808E0E5C6}">
   <ds:schemaRefs>
-    <ds:schemaRef ds:uri="http://schemas.microsoft.com/sharepoint/v3/contenttype/forms"/>
+    <ds:schemaRef ds:uri="b92fdc2a-1594-4510-aa86-45464713a14f"/>
+    <ds:schemaRef ds:uri="http://purl.org/dc/elements/1.1/"/>
+    <ds:schemaRef ds:uri="http://schemas.microsoft.com/office/2006/metadata/properties"/>
+    <ds:schemaRef ds:uri="http://schemas.microsoft.com/sharepoint/v3"/>
+    <ds:schemaRef ds:uri="0cd5e047-7587-471a-b27c-5f56c6d0ac56"/>
+    <ds:schemaRef ds:uri="http://purl.org/dc/terms/"/>
+    <ds:schemaRef ds:uri="http://schemas.openxmlformats.org/package/2006/metadata/core-properties"/>
+    <ds:schemaRef ds:uri="http://schemas.microsoft.com/office/2006/documentManagement/types"/>
+    <ds:schemaRef ds:uri="http://schemas.microsoft.com/office/infopath/2007/PartnerControls"/>
+    <ds:schemaRef ds:uri="http://www.w3.org/XML/1998/namespace"/>
+    <ds:schemaRef ds:uri="http://purl.org/dc/dcmitype/"/>
   </ds:schemaRefs>
 </ds:datastoreItem>
 </file>
</xml_diff>